<commit_message>
#2317 updated programming HL slides
git-svn-id: https://src.heuristiclab.com/svn/core/trunk@12253 2abd9481-f8db-48e9-bd25-06bc13291c1b
</commit_message>
<xml_diff>
--- a/documentation/Tutorials/Programming HeuristicLab - Algorithms and Problems.pptx
+++ b/documentation/Tutorials/Programming HeuristicLab - Algorithms and Problems.pptx
@@ -5510,7 +5510,7 @@
         </p:nvSpPr>
         <p:spPr bwMode="auto">
           <a:xfrm>
-            <a:off x="700844" y="4593610"/>
+            <a:off x="792088" y="4593610"/>
             <a:ext cx="3779912" cy="276999"/>
           </a:xfrm>
           <a:prstGeom prst="rect">
@@ -5621,7 +5621,7 @@
         </p:nvSpPr>
         <p:spPr bwMode="auto">
           <a:xfrm>
-            <a:off x="683568" y="2276872"/>
+            <a:off x="793661" y="2276872"/>
             <a:ext cx="8170827" cy="830997"/>
           </a:xfrm>
           <a:prstGeom prst="rect">
@@ -9798,15 +9798,7 @@
           <a:p>
             <a:r>
               <a:rPr lang="en-US" dirty="0" smtClean="0"/>
-              <a:t>Contains variables (e.g</a:t>
-            </a:r>
-            <a:r>
-              <a:rPr lang="en-US" dirty="0" smtClean="0"/>
-              <a:t>., </a:t>
-            </a:r>
-            <a:r>
-              <a:rPr lang="en-US" dirty="0" smtClean="0"/>
-              <a:t>solutions or their quality)</a:t>
+              <a:t>Contains variables (e.g., solutions or their quality)</a:t>
             </a:r>
           </a:p>
           <a:p>
@@ -11785,15 +11777,7 @@
           <a:p>
             <a:r>
               <a:rPr lang="en-US" dirty="0" smtClean="0"/>
-              <a:t>Base </a:t>
-            </a:r>
-            <a:r>
-              <a:rPr lang="en-US" dirty="0" smtClean="0"/>
-              <a:t>classes/Interfaces </a:t>
-            </a:r>
-            <a:r>
-              <a:rPr lang="en-US" dirty="0" smtClean="0"/>
-              <a:t/>
+              <a:t>Base classes/Interfaces </a:t>
             </a:r>
             <a:br>
               <a:rPr lang="en-US" dirty="0" smtClean="0"/>
@@ -11960,11 +11944,7 @@
             </a:r>
             <a:r>
               <a:rPr lang="en-US" dirty="0" smtClean="0"/>
-              <a:t>classes/Interfaces </a:t>
-            </a:r>
-            <a:r>
-              <a:rPr lang="en-US" dirty="0" smtClean="0"/>
-              <a:t>for </a:t>
+              <a:t>classes/Interfaces for </a:t>
             </a:r>
             <a:r>
               <a:rPr lang="en-US" dirty="0"/>
@@ -12314,15 +12294,7 @@
           <a:p>
             <a:r>
               <a:rPr lang="en-US" dirty="0" smtClean="0"/>
-              <a:t>Discover operators from the </a:t>
-            </a:r>
-            <a:r>
-              <a:rPr lang="en-US" dirty="0" smtClean="0"/>
-              <a:t>operators </a:t>
-            </a:r>
-            <a:r>
-              <a:rPr lang="en-US" dirty="0" smtClean="0"/>
-              <a:t>collection of the problem/encoding</a:t>
+              <a:t>Discover operators from the operators collection of the problem/encoding</a:t>
             </a:r>
           </a:p>
           <a:p>
@@ -12528,13 +12500,8 @@
             <a:pPr lvl="1"/>
             <a:r>
               <a:rPr lang="en-GB" dirty="0" smtClean="0"/>
-              <a:t>Don’t support </a:t>
-            </a:r>
-            <a:r>
-              <a:rPr lang="en-GB" dirty="0" smtClean="0"/>
-              <a:t>pausing</a:t>
-            </a:r>
-            <a:endParaRPr lang="en-GB" dirty="0" smtClean="0"/>
+              <a:t>Don’t support pausing</a:t>
+            </a:r>
           </a:p>
         </p:txBody>
       </p:sp>
@@ -15250,21 +15217,8 @@
           <a:p>
             <a:r>
               <a:rPr lang="en-US" dirty="0" smtClean="0"/>
-              <a:t>Contain the „problem data“ (e.g</a:t>
-            </a:r>
-            <a:r>
-              <a:rPr lang="en-US" dirty="0" smtClean="0"/>
-              <a:t>., </a:t>
-            </a:r>
-            <a:r>
-              <a:rPr lang="en-US" dirty="0" smtClean="0"/>
-              <a:t>a distance matrix, a simulation, a function definition), usually supplied by a </a:t>
-            </a:r>
-            <a:r>
-              <a:rPr lang="en-US" dirty="0" smtClean="0"/>
-              <a:t>problem instance provider</a:t>
-            </a:r>
-            <a:endParaRPr lang="en-US" dirty="0" smtClean="0"/>
+              <a:t>Contain the „problem data“ (e.g., a distance matrix, a simulation, a function definition), usually supplied by a problem instance provider</a:t>
+            </a:r>
           </a:p>
           <a:p>
             <a:r>
@@ -15754,15 +15708,7 @@
           <a:p>
             <a:r>
               <a:rPr lang="en-US" dirty="0" smtClean="0"/>
-              <a:t>Base </a:t>
-            </a:r>
-            <a:r>
-              <a:rPr lang="en-US" dirty="0" smtClean="0"/>
-              <a:t>classes/Interfaces </a:t>
-            </a:r>
-            <a:r>
-              <a:rPr lang="en-US" dirty="0" smtClean="0"/>
-              <a:t>for problems</a:t>
+              <a:t>Base classes/Interfaces for problems</a:t>
             </a:r>
             <a:endParaRPr lang="en-US" dirty="0"/>
           </a:p>
@@ -16431,15 +16377,7 @@
             </a:r>
             <a:r>
               <a:rPr lang="en-GB" sz="3200" dirty="0" smtClean="0"/>
-              <a:t>types, e.g</a:t>
-            </a:r>
-            <a:r>
-              <a:rPr lang="en-GB" sz="3200" dirty="0" smtClean="0"/>
-              <a:t>., </a:t>
-            </a:r>
-            <a:r>
-              <a:rPr lang="en-GB" sz="3200" dirty="0" smtClean="0"/>
-              <a:t>algorithms that use very specific operators</a:t>
+              <a:t>types, e.g., algorithms that use very specific operators</a:t>
             </a:r>
           </a:p>
           <a:p>
@@ -16806,13 +16744,8 @@
           <a:p>
             <a:r>
               <a:rPr lang="en-GB" dirty="0" smtClean="0"/>
-              <a:t>Define </a:t>
-            </a:r>
-            <a:r>
-              <a:rPr lang="en-GB" dirty="0" smtClean="0"/>
-              <a:t>encoding</a:t>
-            </a:r>
-            <a:endParaRPr lang="en-GB" dirty="0" smtClean="0"/>
+              <a:t>Define encoding</a:t>
+            </a:r>
           </a:p>
           <a:p>
             <a:endParaRPr lang="en-GB" dirty="0"/>
@@ -17679,7 +17612,7 @@
         </p:nvSpPr>
         <p:spPr bwMode="auto">
           <a:xfrm>
-            <a:off x="718480" y="3796823"/>
+            <a:off x="827584" y="3796823"/>
             <a:ext cx="7048546" cy="276999"/>
           </a:xfrm>
           <a:prstGeom prst="rect">
@@ -17958,7 +17891,7 @@
         </p:nvSpPr>
         <p:spPr bwMode="auto">
           <a:xfrm>
-            <a:off x="718480" y="5445224"/>
+            <a:off x="827584" y="5445224"/>
             <a:ext cx="7408586" cy="461665"/>
           </a:xfrm>
           <a:prstGeom prst="rect">
@@ -18812,7 +18745,27 @@
                 <a:latin typeface="Consolas" panose="020B0609020204030204" pitchFamily="49" charset="0"/>
                 <a:cs typeface="Consolas" panose="020B0609020204030204" pitchFamily="49" charset="0"/>
               </a:rPr>
-              <a:t>) : </a:t>
+              <a:t>) </a:t>
+            </a:r>
+            <a:endParaRPr lang="de-DE" sz="1600" dirty="0" smtClean="0">
+              <a:latin typeface="Consolas" panose="020B0609020204030204" pitchFamily="49" charset="0"/>
+              <a:cs typeface="Consolas" panose="020B0609020204030204" pitchFamily="49" charset="0"/>
+            </a:endParaRPr>
+          </a:p>
+          <a:p>
+            <a:r>
+              <a:rPr lang="de-DE" sz="1600" dirty="0">
+                <a:latin typeface="Consolas" panose="020B0609020204030204" pitchFamily="49" charset="0"/>
+                <a:cs typeface="Consolas" panose="020B0609020204030204" pitchFamily="49" charset="0"/>
+              </a:rPr>
+              <a:t>	</a:t>
+            </a:r>
+            <a:r>
+              <a:rPr lang="de-DE" sz="1600" dirty="0" smtClean="0">
+                <a:latin typeface="Consolas" panose="020B0609020204030204" pitchFamily="49" charset="0"/>
+                <a:cs typeface="Consolas" panose="020B0609020204030204" pitchFamily="49" charset="0"/>
+              </a:rPr>
+              <a:t>: </a:t>
             </a:r>
             <a:r>
               <a:rPr lang="de-DE" sz="1600" b="1" dirty="0" err="1">
@@ -19641,7 +19594,6 @@
               <a:rPr lang="en-US" sz="2800" dirty="0" smtClean="0"/>
               <a:t> </a:t>
             </a:r>
-            <a:endParaRPr lang="en-US" sz="2800" dirty="0" smtClean="0"/>
           </a:p>
           <a:p>
             <a:pPr algn="ctr"/>
@@ -19665,7 +19617,6 @@
               <a:rPr lang="en-US" sz="2800" dirty="0" smtClean="0"/>
               <a:t> </a:t>
             </a:r>
-            <a:endParaRPr lang="en-US" sz="2800" dirty="0" smtClean="0"/>
           </a:p>
           <a:p>
             <a:pPr algn="ctr"/>
@@ -20161,15 +20112,7 @@
           <a:p>
             <a:r>
               <a:rPr lang="en-US" dirty="0" smtClean="0"/>
-              <a:t>E.g</a:t>
-            </a:r>
-            <a:r>
-              <a:rPr lang="en-US" dirty="0" smtClean="0"/>
-              <a:t>., </a:t>
-            </a:r>
-            <a:r>
-              <a:rPr lang="en-US" dirty="0" smtClean="0"/>
-              <a:t>population size, analyzers, crossover operator</a:t>
+              <a:t>E.g., population size, analyzers, crossover operator</a:t>
             </a:r>
           </a:p>
           <a:p>
@@ -20387,15 +20330,7 @@
             <a:pPr lvl="1"/>
             <a:r>
               <a:rPr lang="en-US" dirty="0" smtClean="0"/>
-              <a:t>Stores a value (Item) that can be looked </a:t>
-            </a:r>
-            <a:r>
-              <a:rPr lang="en-US" dirty="0" smtClean="0"/>
-              <a:t>up; e.g., </a:t>
-            </a:r>
-            <a:r>
-              <a:rPr lang="en-US" dirty="0" smtClean="0"/>
-              <a:t>mutation rate, crossover operator,…</a:t>
+              <a:t>Stores a value (Item) that can be looked up; e.g., mutation rate, crossover operator,…</a:t>
             </a:r>
           </a:p>
           <a:p>
@@ -20726,7 +20661,20 @@
             </a:r>
             <a:r>
               <a:rPr lang="en-US" dirty="0" smtClean="0"/>
-              <a:t> has a </a:t>
+              <a:t> has a parameters collection</a:t>
+            </a:r>
+          </a:p>
+          <a:p>
+            <a:r>
+              <a:rPr lang="en-US" dirty="0" smtClean="0"/>
+              <a:t>Normally used in the following way:</a:t>
+            </a:r>
+          </a:p>
+          <a:p>
+            <a:pPr lvl="1"/>
+            <a:r>
+              <a:rPr lang="en-US" dirty="0" smtClean="0"/>
+              <a:t>Add parameter to </a:t>
             </a:r>
             <a:r>
               <a:rPr lang="en-US" dirty="0" smtClean="0"/>
@@ -20735,19 +20683,6 @@
             <a:r>
               <a:rPr lang="en-US" dirty="0" smtClean="0"/>
               <a:t>collection</a:t>
-            </a:r>
-          </a:p>
-          <a:p>
-            <a:r>
-              <a:rPr lang="en-US" dirty="0" smtClean="0"/>
-              <a:t>Normally used in the following way:</a:t>
-            </a:r>
-          </a:p>
-          <a:p>
-            <a:pPr lvl="1"/>
-            <a:r>
-              <a:rPr lang="en-US" dirty="0" smtClean="0"/>
-              <a:t>Add parameter to Parameters collection</a:t>
             </a:r>
             <a:endParaRPr lang="en-US" dirty="0"/>
           </a:p>
@@ -21134,6 +21069,936 @@
           </a:p>
         </p:txBody>
       </p:sp>
+      <p:sp>
+        <p:nvSpPr>
+          <p:cNvPr id="8" name="Rectangle 1"/>
+          <p:cNvSpPr>
+            <a:spLocks noChangeArrowheads="1"/>
+          </p:cNvSpPr>
+          <p:nvPr/>
+        </p:nvSpPr>
+        <p:spPr bwMode="auto">
+          <a:xfrm>
+            <a:off x="747936" y="3194496"/>
+            <a:ext cx="6200328" cy="461665"/>
+          </a:xfrm>
+          <a:prstGeom prst="rect">
+            <a:avLst/>
+          </a:prstGeom>
+          <a:solidFill>
+            <a:srgbClr val="FFFFFF"/>
+          </a:solidFill>
+          <a:ln>
+            <a:noFill/>
+          </a:ln>
+          <a:effectLst/>
+          <a:extLst>
+            <a:ext uri="{91240B29-F687-4F45-9708-019B960494DF}">
+              <a14:hiddenLine xmlns:a14="http://schemas.microsoft.com/office/drawing/2010/main" w="9525">
+                <a:solidFill>
+                  <a:schemeClr val="tx1"/>
+                </a:solidFill>
+                <a:miter lim="800000"/>
+                <a:headEnd/>
+                <a:tailEnd/>
+              </a14:hiddenLine>
+            </a:ext>
+            <a:ext uri="{AF507438-7753-43E0-B8FC-AC1667EBCBE1}">
+              <a14:hiddenEffects xmlns:a14="http://schemas.microsoft.com/office/drawing/2010/main">
+                <a:effectLst>
+                  <a:outerShdw dist="35921" dir="2700000" algn="ctr" rotWithShape="0">
+                    <a:schemeClr val="bg2"/>
+                  </a:outerShdw>
+                </a:effectLst>
+              </a14:hiddenEffects>
+            </a:ext>
+          </a:extLst>
+        </p:spPr>
+        <p:txBody>
+          <a:bodyPr vert="horz" wrap="square" lIns="91440" tIns="45720" rIns="91440" bIns="45720" numCol="1" anchor="ctr" anchorCtr="0" compatLnSpc="1">
+            <a:prstTxWarp prst="textNoShape">
+              <a:avLst/>
+            </a:prstTxWarp>
+            <a:spAutoFit/>
+          </a:bodyPr>
+          <a:lstStyle/>
+          <a:p>
+            <a:pPr marL="0" marR="0" lvl="0" indent="0" algn="l" defTabSz="914400" rtl="0" eaLnBrk="0" fontAlgn="base" latinLnBrk="0" hangingPunct="0">
+              <a:lnSpc>
+                <a:spcPct val="100000"/>
+              </a:lnSpc>
+              <a:spcBef>
+                <a:spcPct val="0"/>
+              </a:spcBef>
+              <a:spcAft>
+                <a:spcPct val="0"/>
+              </a:spcAft>
+              <a:buClrTx/>
+              <a:buSzTx/>
+              <a:buFontTx/>
+              <a:buNone/>
+              <a:tabLst/>
+            </a:pPr>
+            <a:r>
+              <a:rPr kumimoji="0" lang="de-DE" altLang="de-DE" sz="1200" b="0" i="0" u="none" strike="noStrike" cap="none" normalizeH="0" baseline="0" dirty="0" err="1" smtClean="0">
+                <a:ln>
+                  <a:noFill/>
+                </a:ln>
+                <a:solidFill>
+                  <a:srgbClr val="000000"/>
+                </a:solidFill>
+                <a:effectLst/>
+                <a:latin typeface="Consolas" panose="020B0609020204030204" pitchFamily="49" charset="0"/>
+                <a:cs typeface="Consolas" panose="020B0609020204030204" pitchFamily="49" charset="0"/>
+              </a:rPr>
+              <a:t>Parameters.Add</a:t>
+            </a:r>
+            <a:r>
+              <a:rPr kumimoji="0" lang="de-DE" altLang="de-DE" sz="1200" b="0" i="0" u="none" strike="noStrike" cap="none" normalizeH="0" baseline="0" dirty="0" smtClean="0">
+                <a:ln>
+                  <a:noFill/>
+                </a:ln>
+                <a:solidFill>
+                  <a:srgbClr val="000000"/>
+                </a:solidFill>
+                <a:effectLst/>
+                <a:latin typeface="Consolas" panose="020B0609020204030204" pitchFamily="49" charset="0"/>
+                <a:cs typeface="Consolas" panose="020B0609020204030204" pitchFamily="49" charset="0"/>
+              </a:rPr>
+              <a:t>(</a:t>
+            </a:r>
+            <a:r>
+              <a:rPr kumimoji="0" lang="de-DE" altLang="de-DE" sz="1200" b="0" i="0" u="none" strike="noStrike" cap="none" normalizeH="0" baseline="0" dirty="0" err="1" smtClean="0">
+                <a:ln>
+                  <a:noFill/>
+                </a:ln>
+                <a:solidFill>
+                  <a:srgbClr val="0000FF"/>
+                </a:solidFill>
+                <a:effectLst/>
+                <a:latin typeface="Consolas" panose="020B0609020204030204" pitchFamily="49" charset="0"/>
+                <a:cs typeface="Consolas" panose="020B0609020204030204" pitchFamily="49" charset="0"/>
+              </a:rPr>
+              <a:t>new</a:t>
+            </a:r>
+            <a:r>
+              <a:rPr kumimoji="0" lang="de-DE" altLang="de-DE" sz="1200" b="0" i="0" u="none" strike="noStrike" cap="none" normalizeH="0" baseline="0" dirty="0" smtClean="0">
+                <a:ln>
+                  <a:noFill/>
+                </a:ln>
+                <a:solidFill>
+                  <a:srgbClr val="000000"/>
+                </a:solidFill>
+                <a:effectLst/>
+                <a:latin typeface="Consolas" panose="020B0609020204030204" pitchFamily="49" charset="0"/>
+                <a:cs typeface="Consolas" panose="020B0609020204030204" pitchFamily="49" charset="0"/>
+              </a:rPr>
+              <a:t> </a:t>
+            </a:r>
+            <a:r>
+              <a:rPr kumimoji="0" lang="de-DE" altLang="de-DE" sz="1200" b="0" i="0" u="none" strike="noStrike" cap="none" normalizeH="0" baseline="0" dirty="0" err="1" smtClean="0">
+                <a:ln>
+                  <a:noFill/>
+                </a:ln>
+                <a:solidFill>
+                  <a:srgbClr val="2B91AF"/>
+                </a:solidFill>
+                <a:effectLst/>
+                <a:latin typeface="Consolas" panose="020B0609020204030204" pitchFamily="49" charset="0"/>
+                <a:cs typeface="Consolas" panose="020B0609020204030204" pitchFamily="49" charset="0"/>
+              </a:rPr>
+              <a:t>ConstrainedValueParameter</a:t>
+            </a:r>
+            <a:r>
+              <a:rPr kumimoji="0" lang="de-DE" altLang="de-DE" sz="1200" b="0" i="0" u="none" strike="noStrike" cap="none" normalizeH="0" baseline="0" dirty="0" smtClean="0">
+                <a:ln>
+                  <a:noFill/>
+                </a:ln>
+                <a:solidFill>
+                  <a:srgbClr val="000000"/>
+                </a:solidFill>
+                <a:effectLst/>
+                <a:latin typeface="Consolas" panose="020B0609020204030204" pitchFamily="49" charset="0"/>
+                <a:cs typeface="Consolas" panose="020B0609020204030204" pitchFamily="49" charset="0"/>
+              </a:rPr>
+              <a:t>&lt;</a:t>
+            </a:r>
+            <a:r>
+              <a:rPr kumimoji="0" lang="de-DE" altLang="de-DE" sz="1200" b="0" i="0" u="none" strike="noStrike" cap="none" normalizeH="0" baseline="0" dirty="0" err="1" smtClean="0">
+                <a:ln>
+                  <a:noFill/>
+                </a:ln>
+                <a:solidFill>
+                  <a:srgbClr val="2B91AF"/>
+                </a:solidFill>
+                <a:effectLst/>
+                <a:latin typeface="Consolas" panose="020B0609020204030204" pitchFamily="49" charset="0"/>
+                <a:cs typeface="Consolas" panose="020B0609020204030204" pitchFamily="49" charset="0"/>
+              </a:rPr>
+              <a:t>ICrossover</a:t>
+            </a:r>
+            <a:r>
+              <a:rPr kumimoji="0" lang="de-DE" altLang="de-DE" sz="1200" b="0" i="0" u="none" strike="noStrike" cap="none" normalizeH="0" baseline="0" dirty="0" smtClean="0">
+                <a:ln>
+                  <a:noFill/>
+                </a:ln>
+                <a:solidFill>
+                  <a:srgbClr val="000000"/>
+                </a:solidFill>
+                <a:effectLst/>
+                <a:latin typeface="Consolas" panose="020B0609020204030204" pitchFamily="49" charset="0"/>
+                <a:cs typeface="Consolas" panose="020B0609020204030204" pitchFamily="49" charset="0"/>
+              </a:rPr>
+              <a:t>&gt;(</a:t>
+            </a:r>
+            <a:r>
+              <a:rPr kumimoji="0" lang="de-DE" altLang="de-DE" sz="1200" b="0" i="0" u="none" strike="noStrike" cap="none" normalizeH="0" baseline="0" dirty="0" smtClean="0">
+                <a:ln>
+                  <a:noFill/>
+                </a:ln>
+                <a:solidFill>
+                  <a:srgbClr val="A31515"/>
+                </a:solidFill>
+                <a:effectLst/>
+                <a:latin typeface="Consolas" panose="020B0609020204030204" pitchFamily="49" charset="0"/>
+                <a:cs typeface="Consolas" panose="020B0609020204030204" pitchFamily="49" charset="0"/>
+              </a:rPr>
+              <a:t>"Crossover"</a:t>
+            </a:r>
+            <a:r>
+              <a:rPr kumimoji="0" lang="de-DE" altLang="de-DE" sz="1200" b="0" i="0" u="none" strike="noStrike" cap="none" normalizeH="0" baseline="0" dirty="0" smtClean="0">
+                <a:ln>
+                  <a:noFill/>
+                </a:ln>
+                <a:solidFill>
+                  <a:srgbClr val="000000"/>
+                </a:solidFill>
+                <a:effectLst/>
+                <a:latin typeface="Consolas" panose="020B0609020204030204" pitchFamily="49" charset="0"/>
+                <a:cs typeface="Consolas" panose="020B0609020204030204" pitchFamily="49" charset="0"/>
+              </a:rPr>
+              <a:t>, </a:t>
+            </a:r>
+          </a:p>
+          <a:p>
+            <a:pPr marL="0" marR="0" lvl="0" indent="0" algn="l" defTabSz="914400" rtl="0" eaLnBrk="0" fontAlgn="base" latinLnBrk="0" hangingPunct="0">
+              <a:lnSpc>
+                <a:spcPct val="100000"/>
+              </a:lnSpc>
+              <a:spcBef>
+                <a:spcPct val="0"/>
+              </a:spcBef>
+              <a:spcAft>
+                <a:spcPct val="0"/>
+              </a:spcAft>
+              <a:buClrTx/>
+              <a:buSzTx/>
+              <a:buFontTx/>
+              <a:buNone/>
+              <a:tabLst/>
+            </a:pPr>
+            <a:r>
+              <a:rPr kumimoji="0" lang="de-DE" altLang="de-DE" sz="1200" b="0" i="0" u="none" strike="noStrike" cap="none" normalizeH="0" baseline="0" dirty="0" smtClean="0">
+                <a:ln>
+                  <a:noFill/>
+                </a:ln>
+                <a:solidFill>
+                  <a:srgbClr val="A31515"/>
+                </a:solidFill>
+                <a:effectLst/>
+                <a:latin typeface="Consolas" panose="020B0609020204030204" pitchFamily="49" charset="0"/>
+                <a:cs typeface="Consolas" panose="020B0609020204030204" pitchFamily="49" charset="0"/>
+              </a:rPr>
+              <a:t>"The </a:t>
+            </a:r>
+            <a:r>
+              <a:rPr kumimoji="0" lang="de-DE" altLang="de-DE" sz="1200" b="0" i="0" u="none" strike="noStrike" cap="none" normalizeH="0" baseline="0" dirty="0" err="1" smtClean="0">
+                <a:ln>
+                  <a:noFill/>
+                </a:ln>
+                <a:solidFill>
+                  <a:srgbClr val="A31515"/>
+                </a:solidFill>
+                <a:effectLst/>
+                <a:latin typeface="Consolas" panose="020B0609020204030204" pitchFamily="49" charset="0"/>
+                <a:cs typeface="Consolas" panose="020B0609020204030204" pitchFamily="49" charset="0"/>
+              </a:rPr>
+              <a:t>operator</a:t>
+            </a:r>
+            <a:r>
+              <a:rPr kumimoji="0" lang="de-DE" altLang="de-DE" sz="1200" b="0" i="0" u="none" strike="noStrike" cap="none" normalizeH="0" baseline="0" dirty="0" smtClean="0">
+                <a:ln>
+                  <a:noFill/>
+                </a:ln>
+                <a:solidFill>
+                  <a:srgbClr val="A31515"/>
+                </a:solidFill>
+                <a:effectLst/>
+                <a:latin typeface="Consolas" panose="020B0609020204030204" pitchFamily="49" charset="0"/>
+                <a:cs typeface="Consolas" panose="020B0609020204030204" pitchFamily="49" charset="0"/>
+              </a:rPr>
+              <a:t> </a:t>
+            </a:r>
+            <a:r>
+              <a:rPr kumimoji="0" lang="de-DE" altLang="de-DE" sz="1200" b="0" i="0" u="none" strike="noStrike" cap="none" normalizeH="0" baseline="0" dirty="0" err="1" smtClean="0">
+                <a:ln>
+                  <a:noFill/>
+                </a:ln>
+                <a:solidFill>
+                  <a:srgbClr val="A31515"/>
+                </a:solidFill>
+                <a:effectLst/>
+                <a:latin typeface="Consolas" panose="020B0609020204030204" pitchFamily="49" charset="0"/>
+                <a:cs typeface="Consolas" panose="020B0609020204030204" pitchFamily="49" charset="0"/>
+              </a:rPr>
+              <a:t>used</a:t>
+            </a:r>
+            <a:r>
+              <a:rPr kumimoji="0" lang="de-DE" altLang="de-DE" sz="1200" b="0" i="0" u="none" strike="noStrike" cap="none" normalizeH="0" baseline="0" dirty="0" smtClean="0">
+                <a:ln>
+                  <a:noFill/>
+                </a:ln>
+                <a:solidFill>
+                  <a:srgbClr val="A31515"/>
+                </a:solidFill>
+                <a:effectLst/>
+                <a:latin typeface="Consolas" panose="020B0609020204030204" pitchFamily="49" charset="0"/>
+                <a:cs typeface="Consolas" panose="020B0609020204030204" pitchFamily="49" charset="0"/>
+              </a:rPr>
+              <a:t> </a:t>
+            </a:r>
+            <a:r>
+              <a:rPr kumimoji="0" lang="de-DE" altLang="de-DE" sz="1200" b="0" i="0" u="none" strike="noStrike" cap="none" normalizeH="0" baseline="0" dirty="0" err="1" smtClean="0">
+                <a:ln>
+                  <a:noFill/>
+                </a:ln>
+                <a:solidFill>
+                  <a:srgbClr val="A31515"/>
+                </a:solidFill>
+                <a:effectLst/>
+                <a:latin typeface="Consolas" panose="020B0609020204030204" pitchFamily="49" charset="0"/>
+                <a:cs typeface="Consolas" panose="020B0609020204030204" pitchFamily="49" charset="0"/>
+              </a:rPr>
+              <a:t>to</a:t>
+            </a:r>
+            <a:r>
+              <a:rPr kumimoji="0" lang="de-DE" altLang="de-DE" sz="1200" b="0" i="0" u="none" strike="noStrike" cap="none" normalizeH="0" baseline="0" dirty="0" smtClean="0">
+                <a:ln>
+                  <a:noFill/>
+                </a:ln>
+                <a:solidFill>
+                  <a:srgbClr val="A31515"/>
+                </a:solidFill>
+                <a:effectLst/>
+                <a:latin typeface="Consolas" panose="020B0609020204030204" pitchFamily="49" charset="0"/>
+                <a:cs typeface="Consolas" panose="020B0609020204030204" pitchFamily="49" charset="0"/>
+              </a:rPr>
+              <a:t> </a:t>
+            </a:r>
+            <a:r>
+              <a:rPr kumimoji="0" lang="de-DE" altLang="de-DE" sz="1200" b="0" i="0" u="none" strike="noStrike" cap="none" normalizeH="0" baseline="0" dirty="0" err="1" smtClean="0">
+                <a:ln>
+                  <a:noFill/>
+                </a:ln>
+                <a:solidFill>
+                  <a:srgbClr val="A31515"/>
+                </a:solidFill>
+                <a:effectLst/>
+                <a:latin typeface="Consolas" panose="020B0609020204030204" pitchFamily="49" charset="0"/>
+                <a:cs typeface="Consolas" panose="020B0609020204030204" pitchFamily="49" charset="0"/>
+              </a:rPr>
+              <a:t>cross</a:t>
+            </a:r>
+            <a:r>
+              <a:rPr kumimoji="0" lang="de-DE" altLang="de-DE" sz="1200" b="0" i="0" u="none" strike="noStrike" cap="none" normalizeH="0" baseline="0" dirty="0" smtClean="0">
+                <a:ln>
+                  <a:noFill/>
+                </a:ln>
+                <a:solidFill>
+                  <a:srgbClr val="A31515"/>
+                </a:solidFill>
+                <a:effectLst/>
+                <a:latin typeface="Consolas" panose="020B0609020204030204" pitchFamily="49" charset="0"/>
+                <a:cs typeface="Consolas" panose="020B0609020204030204" pitchFamily="49" charset="0"/>
+              </a:rPr>
+              <a:t> </a:t>
+            </a:r>
+            <a:r>
+              <a:rPr kumimoji="0" lang="de-DE" altLang="de-DE" sz="1200" b="0" i="0" u="none" strike="noStrike" cap="none" normalizeH="0" baseline="0" dirty="0" err="1" smtClean="0">
+                <a:ln>
+                  <a:noFill/>
+                </a:ln>
+                <a:solidFill>
+                  <a:srgbClr val="A31515"/>
+                </a:solidFill>
+                <a:effectLst/>
+                <a:latin typeface="Consolas" panose="020B0609020204030204" pitchFamily="49" charset="0"/>
+                <a:cs typeface="Consolas" panose="020B0609020204030204" pitchFamily="49" charset="0"/>
+              </a:rPr>
+              <a:t>solutions</a:t>
+            </a:r>
+            <a:r>
+              <a:rPr kumimoji="0" lang="de-DE" altLang="de-DE" sz="1200" b="0" i="0" u="none" strike="noStrike" cap="none" normalizeH="0" baseline="0" dirty="0" smtClean="0">
+                <a:ln>
+                  <a:noFill/>
+                </a:ln>
+                <a:solidFill>
+                  <a:srgbClr val="A31515"/>
+                </a:solidFill>
+                <a:effectLst/>
+                <a:latin typeface="Consolas" panose="020B0609020204030204" pitchFamily="49" charset="0"/>
+                <a:cs typeface="Consolas" panose="020B0609020204030204" pitchFamily="49" charset="0"/>
+              </a:rPr>
+              <a:t>."</a:t>
+            </a:r>
+            <a:r>
+              <a:rPr kumimoji="0" lang="de-DE" altLang="de-DE" sz="1200" b="0" i="0" u="none" strike="noStrike" cap="none" normalizeH="0" baseline="0" dirty="0" smtClean="0">
+                <a:ln>
+                  <a:noFill/>
+                </a:ln>
+                <a:solidFill>
+                  <a:srgbClr val="000000"/>
+                </a:solidFill>
+                <a:effectLst/>
+                <a:latin typeface="Consolas" panose="020B0609020204030204" pitchFamily="49" charset="0"/>
+                <a:cs typeface="Consolas" panose="020B0609020204030204" pitchFamily="49" charset="0"/>
+              </a:rPr>
+              <a:t>)); </a:t>
+            </a:r>
+            <a:endParaRPr kumimoji="0" lang="de-DE" altLang="de-DE" sz="3200" b="0" i="0" u="none" strike="noStrike" cap="none" normalizeH="0" baseline="0" dirty="0" smtClean="0">
+              <a:ln>
+                <a:noFill/>
+              </a:ln>
+              <a:solidFill>
+                <a:schemeClr val="tx1"/>
+              </a:solidFill>
+              <a:effectLst/>
+              <a:latin typeface="Arial" panose="020B0604020202020204" pitchFamily="34" charset="0"/>
+            </a:endParaRPr>
+          </a:p>
+        </p:txBody>
+      </p:sp>
+      <p:sp>
+        <p:nvSpPr>
+          <p:cNvPr id="9" name="Rectangle 2"/>
+          <p:cNvSpPr>
+            <a:spLocks noChangeArrowheads="1"/>
+          </p:cNvSpPr>
+          <p:nvPr/>
+        </p:nvSpPr>
+        <p:spPr bwMode="auto">
+          <a:xfrm>
+            <a:off x="747936" y="4812244"/>
+            <a:ext cx="6200328" cy="446276"/>
+          </a:xfrm>
+          <a:prstGeom prst="rect">
+            <a:avLst/>
+          </a:prstGeom>
+          <a:solidFill>
+            <a:srgbClr val="FFFFFF"/>
+          </a:solidFill>
+          <a:ln>
+            <a:noFill/>
+          </a:ln>
+          <a:effectLst/>
+          <a:extLst>
+            <a:ext uri="{91240B29-F687-4F45-9708-019B960494DF}">
+              <a14:hiddenLine xmlns:a14="http://schemas.microsoft.com/office/drawing/2010/main" w="9525">
+                <a:solidFill>
+                  <a:schemeClr val="tx1"/>
+                </a:solidFill>
+                <a:miter lim="800000"/>
+                <a:headEnd/>
+                <a:tailEnd/>
+              </a14:hiddenLine>
+            </a:ext>
+            <a:ext uri="{AF507438-7753-43E0-B8FC-AC1667EBCBE1}">
+              <a14:hiddenEffects xmlns:a14="http://schemas.microsoft.com/office/drawing/2010/main">
+                <a:effectLst>
+                  <a:outerShdw dist="35921" dir="2700000" algn="ctr" rotWithShape="0">
+                    <a:schemeClr val="bg2"/>
+                  </a:outerShdw>
+                </a:effectLst>
+              </a14:hiddenEffects>
+            </a:ext>
+          </a:extLst>
+        </p:spPr>
+        <p:txBody>
+          <a:bodyPr vert="horz" wrap="square" lIns="91440" tIns="45720" rIns="91440" bIns="45720" numCol="1" anchor="ctr" anchorCtr="0" compatLnSpc="1">
+            <a:prstTxWarp prst="textNoShape">
+              <a:avLst/>
+            </a:prstTxWarp>
+            <a:spAutoFit/>
+          </a:bodyPr>
+          <a:lstStyle/>
+          <a:p>
+            <a:pPr marL="0" marR="0" lvl="0" indent="0" algn="l" defTabSz="914400" rtl="0" eaLnBrk="0" fontAlgn="base" latinLnBrk="0" hangingPunct="0">
+              <a:lnSpc>
+                <a:spcPct val="100000"/>
+              </a:lnSpc>
+              <a:spcBef>
+                <a:spcPct val="0"/>
+              </a:spcBef>
+              <a:spcAft>
+                <a:spcPct val="0"/>
+              </a:spcAft>
+              <a:buClrTx/>
+              <a:buSzTx/>
+              <a:buFontTx/>
+              <a:buNone/>
+              <a:tabLst/>
+            </a:pPr>
+            <a:r>
+              <a:rPr kumimoji="0" lang="de-DE" altLang="de-DE" sz="1100" b="0" i="0" u="none" strike="noStrike" cap="none" normalizeH="0" baseline="0" dirty="0" err="1" smtClean="0">
+                <a:ln>
+                  <a:noFill/>
+                </a:ln>
+                <a:solidFill>
+                  <a:srgbClr val="000000"/>
+                </a:solidFill>
+                <a:effectLst/>
+                <a:latin typeface="Consolas" panose="020B0609020204030204" pitchFamily="49" charset="0"/>
+                <a:cs typeface="Consolas" panose="020B0609020204030204" pitchFamily="49" charset="0"/>
+              </a:rPr>
+              <a:t>Parameters.Add</a:t>
+            </a:r>
+            <a:r>
+              <a:rPr kumimoji="0" lang="de-DE" altLang="de-DE" sz="1100" b="0" i="0" u="none" strike="noStrike" cap="none" normalizeH="0" baseline="0" dirty="0" smtClean="0">
+                <a:ln>
+                  <a:noFill/>
+                </a:ln>
+                <a:solidFill>
+                  <a:srgbClr val="000000"/>
+                </a:solidFill>
+                <a:effectLst/>
+                <a:latin typeface="Consolas" panose="020B0609020204030204" pitchFamily="49" charset="0"/>
+                <a:cs typeface="Consolas" panose="020B0609020204030204" pitchFamily="49" charset="0"/>
+              </a:rPr>
+              <a:t>(</a:t>
+            </a:r>
+            <a:r>
+              <a:rPr kumimoji="0" lang="de-DE" altLang="de-DE" sz="1100" b="0" i="0" u="none" strike="noStrike" cap="none" normalizeH="0" baseline="0" dirty="0" err="1" smtClean="0">
+                <a:ln>
+                  <a:noFill/>
+                </a:ln>
+                <a:solidFill>
+                  <a:srgbClr val="0000FF"/>
+                </a:solidFill>
+                <a:effectLst/>
+                <a:latin typeface="Consolas" panose="020B0609020204030204" pitchFamily="49" charset="0"/>
+                <a:cs typeface="Consolas" panose="020B0609020204030204" pitchFamily="49" charset="0"/>
+              </a:rPr>
+              <a:t>new</a:t>
+            </a:r>
+            <a:r>
+              <a:rPr kumimoji="0" lang="de-DE" altLang="de-DE" sz="1100" b="0" i="0" u="none" strike="noStrike" cap="none" normalizeH="0" baseline="0" dirty="0" smtClean="0">
+                <a:ln>
+                  <a:noFill/>
+                </a:ln>
+                <a:solidFill>
+                  <a:srgbClr val="000000"/>
+                </a:solidFill>
+                <a:effectLst/>
+                <a:latin typeface="Consolas" panose="020B0609020204030204" pitchFamily="49" charset="0"/>
+                <a:cs typeface="Consolas" panose="020B0609020204030204" pitchFamily="49" charset="0"/>
+              </a:rPr>
+              <a:t> </a:t>
+            </a:r>
+            <a:r>
+              <a:rPr kumimoji="0" lang="de-DE" altLang="de-DE" sz="1100" b="0" i="0" u="none" strike="noStrike" cap="none" normalizeH="0" baseline="0" dirty="0" err="1" smtClean="0">
+                <a:ln>
+                  <a:noFill/>
+                </a:ln>
+                <a:solidFill>
+                  <a:srgbClr val="2B91AF"/>
+                </a:solidFill>
+                <a:effectLst/>
+                <a:latin typeface="Consolas" panose="020B0609020204030204" pitchFamily="49" charset="0"/>
+                <a:cs typeface="Consolas" panose="020B0609020204030204" pitchFamily="49" charset="0"/>
+              </a:rPr>
+              <a:t>ValueParameter</a:t>
+            </a:r>
+            <a:r>
+              <a:rPr kumimoji="0" lang="de-DE" altLang="de-DE" sz="1100" b="0" i="0" u="none" strike="noStrike" cap="none" normalizeH="0" baseline="0" dirty="0" smtClean="0">
+                <a:ln>
+                  <a:noFill/>
+                </a:ln>
+                <a:solidFill>
+                  <a:srgbClr val="000000"/>
+                </a:solidFill>
+                <a:effectLst/>
+                <a:latin typeface="Consolas" panose="020B0609020204030204" pitchFamily="49" charset="0"/>
+                <a:cs typeface="Consolas" panose="020B0609020204030204" pitchFamily="49" charset="0"/>
+              </a:rPr>
+              <a:t>&lt;</a:t>
+            </a:r>
+            <a:r>
+              <a:rPr kumimoji="0" lang="de-DE" altLang="de-DE" sz="1100" b="0" i="0" u="none" strike="noStrike" cap="none" normalizeH="0" baseline="0" dirty="0" err="1" smtClean="0">
+                <a:ln>
+                  <a:noFill/>
+                </a:ln>
+                <a:solidFill>
+                  <a:srgbClr val="2B91AF"/>
+                </a:solidFill>
+                <a:effectLst/>
+                <a:latin typeface="Consolas" panose="020B0609020204030204" pitchFamily="49" charset="0"/>
+                <a:cs typeface="Consolas" panose="020B0609020204030204" pitchFamily="49" charset="0"/>
+              </a:rPr>
+              <a:t>IntValue</a:t>
+            </a:r>
+            <a:r>
+              <a:rPr kumimoji="0" lang="de-DE" altLang="de-DE" sz="1100" b="0" i="0" u="none" strike="noStrike" cap="none" normalizeH="0" baseline="0" dirty="0" smtClean="0">
+                <a:ln>
+                  <a:noFill/>
+                </a:ln>
+                <a:solidFill>
+                  <a:srgbClr val="000000"/>
+                </a:solidFill>
+                <a:effectLst/>
+                <a:latin typeface="Consolas" panose="020B0609020204030204" pitchFamily="49" charset="0"/>
+                <a:cs typeface="Consolas" panose="020B0609020204030204" pitchFamily="49" charset="0"/>
+              </a:rPr>
+              <a:t>&gt;(</a:t>
+            </a:r>
+            <a:r>
+              <a:rPr kumimoji="0" lang="de-DE" altLang="de-DE" sz="1100" b="0" i="0" u="none" strike="noStrike" cap="none" normalizeH="0" baseline="0" dirty="0" smtClean="0">
+                <a:ln>
+                  <a:noFill/>
+                </a:ln>
+                <a:solidFill>
+                  <a:srgbClr val="A31515"/>
+                </a:solidFill>
+                <a:effectLst/>
+                <a:latin typeface="Consolas" panose="020B0609020204030204" pitchFamily="49" charset="0"/>
+                <a:cs typeface="Consolas" panose="020B0609020204030204" pitchFamily="49" charset="0"/>
+              </a:rPr>
+              <a:t>"</a:t>
+            </a:r>
+            <a:r>
+              <a:rPr kumimoji="0" lang="de-DE" altLang="de-DE" sz="1100" b="0" i="0" u="none" strike="noStrike" cap="none" normalizeH="0" baseline="0" dirty="0" err="1" smtClean="0">
+                <a:ln>
+                  <a:noFill/>
+                </a:ln>
+                <a:solidFill>
+                  <a:srgbClr val="A31515"/>
+                </a:solidFill>
+                <a:effectLst/>
+                <a:latin typeface="Consolas" panose="020B0609020204030204" pitchFamily="49" charset="0"/>
+                <a:cs typeface="Consolas" panose="020B0609020204030204" pitchFamily="49" charset="0"/>
+              </a:rPr>
+              <a:t>PopulationSize</a:t>
+            </a:r>
+            <a:r>
+              <a:rPr kumimoji="0" lang="de-DE" altLang="de-DE" sz="1100" b="0" i="0" u="none" strike="noStrike" cap="none" normalizeH="0" baseline="0" dirty="0" smtClean="0">
+                <a:ln>
+                  <a:noFill/>
+                </a:ln>
+                <a:solidFill>
+                  <a:srgbClr val="A31515"/>
+                </a:solidFill>
+                <a:effectLst/>
+                <a:latin typeface="Consolas" panose="020B0609020204030204" pitchFamily="49" charset="0"/>
+                <a:cs typeface="Consolas" panose="020B0609020204030204" pitchFamily="49" charset="0"/>
+              </a:rPr>
+              <a:t>"</a:t>
+            </a:r>
+            <a:r>
+              <a:rPr kumimoji="0" lang="de-DE" altLang="de-DE" sz="1100" b="0" i="0" u="none" strike="noStrike" cap="none" normalizeH="0" baseline="0" dirty="0" smtClean="0">
+                <a:ln>
+                  <a:noFill/>
+                </a:ln>
+                <a:solidFill>
+                  <a:srgbClr val="000000"/>
+                </a:solidFill>
+                <a:effectLst/>
+                <a:latin typeface="Consolas" panose="020B0609020204030204" pitchFamily="49" charset="0"/>
+                <a:cs typeface="Consolas" panose="020B0609020204030204" pitchFamily="49" charset="0"/>
+              </a:rPr>
+              <a:t>, </a:t>
+            </a:r>
+          </a:p>
+          <a:p>
+            <a:pPr marL="0" marR="0" lvl="0" indent="0" algn="l" defTabSz="914400" rtl="0" eaLnBrk="0" fontAlgn="base" latinLnBrk="0" hangingPunct="0">
+              <a:lnSpc>
+                <a:spcPct val="100000"/>
+              </a:lnSpc>
+              <a:spcBef>
+                <a:spcPct val="0"/>
+              </a:spcBef>
+              <a:spcAft>
+                <a:spcPct val="0"/>
+              </a:spcAft>
+              <a:buClrTx/>
+              <a:buSzTx/>
+              <a:buFontTx/>
+              <a:buNone/>
+              <a:tabLst/>
+            </a:pPr>
+            <a:r>
+              <a:rPr kumimoji="0" lang="de-DE" altLang="de-DE" sz="1100" b="0" i="0" u="none" strike="noStrike" cap="none" normalizeH="0" baseline="0" dirty="0" smtClean="0">
+                <a:ln>
+                  <a:noFill/>
+                </a:ln>
+                <a:solidFill>
+                  <a:srgbClr val="A31515"/>
+                </a:solidFill>
+                <a:effectLst/>
+                <a:latin typeface="Consolas" panose="020B0609020204030204" pitchFamily="49" charset="0"/>
+                <a:cs typeface="Consolas" panose="020B0609020204030204" pitchFamily="49" charset="0"/>
+              </a:rPr>
+              <a:t>"The </a:t>
+            </a:r>
+            <a:r>
+              <a:rPr kumimoji="0" lang="de-DE" altLang="de-DE" sz="1100" b="0" i="0" u="none" strike="noStrike" cap="none" normalizeH="0" baseline="0" dirty="0" err="1" smtClean="0">
+                <a:ln>
+                  <a:noFill/>
+                </a:ln>
+                <a:solidFill>
+                  <a:srgbClr val="A31515"/>
+                </a:solidFill>
+                <a:effectLst/>
+                <a:latin typeface="Consolas" panose="020B0609020204030204" pitchFamily="49" charset="0"/>
+                <a:cs typeface="Consolas" panose="020B0609020204030204" pitchFamily="49" charset="0"/>
+              </a:rPr>
+              <a:t>size</a:t>
+            </a:r>
+            <a:r>
+              <a:rPr kumimoji="0" lang="de-DE" altLang="de-DE" sz="1100" b="0" i="0" u="none" strike="noStrike" cap="none" normalizeH="0" baseline="0" dirty="0" smtClean="0">
+                <a:ln>
+                  <a:noFill/>
+                </a:ln>
+                <a:solidFill>
+                  <a:srgbClr val="A31515"/>
+                </a:solidFill>
+                <a:effectLst/>
+                <a:latin typeface="Consolas" panose="020B0609020204030204" pitchFamily="49" charset="0"/>
+                <a:cs typeface="Consolas" panose="020B0609020204030204" pitchFamily="49" charset="0"/>
+              </a:rPr>
+              <a:t> </a:t>
+            </a:r>
+            <a:r>
+              <a:rPr kumimoji="0" lang="de-DE" altLang="de-DE" sz="1100" b="0" i="0" u="none" strike="noStrike" cap="none" normalizeH="0" baseline="0" dirty="0" err="1" smtClean="0">
+                <a:ln>
+                  <a:noFill/>
+                </a:ln>
+                <a:solidFill>
+                  <a:srgbClr val="A31515"/>
+                </a:solidFill>
+                <a:effectLst/>
+                <a:latin typeface="Consolas" panose="020B0609020204030204" pitchFamily="49" charset="0"/>
+                <a:cs typeface="Consolas" panose="020B0609020204030204" pitchFamily="49" charset="0"/>
+              </a:rPr>
+              <a:t>of</a:t>
+            </a:r>
+            <a:r>
+              <a:rPr kumimoji="0" lang="de-DE" altLang="de-DE" sz="1100" b="0" i="0" u="none" strike="noStrike" cap="none" normalizeH="0" baseline="0" dirty="0" smtClean="0">
+                <a:ln>
+                  <a:noFill/>
+                </a:ln>
+                <a:solidFill>
+                  <a:srgbClr val="A31515"/>
+                </a:solidFill>
+                <a:effectLst/>
+                <a:latin typeface="Consolas" panose="020B0609020204030204" pitchFamily="49" charset="0"/>
+                <a:cs typeface="Consolas" panose="020B0609020204030204" pitchFamily="49" charset="0"/>
+              </a:rPr>
+              <a:t> </a:t>
+            </a:r>
+            <a:r>
+              <a:rPr kumimoji="0" lang="de-DE" altLang="de-DE" sz="1100" b="0" i="0" u="none" strike="noStrike" cap="none" normalizeH="0" baseline="0" dirty="0" err="1" smtClean="0">
+                <a:ln>
+                  <a:noFill/>
+                </a:ln>
+                <a:solidFill>
+                  <a:srgbClr val="A31515"/>
+                </a:solidFill>
+                <a:effectLst/>
+                <a:latin typeface="Consolas" panose="020B0609020204030204" pitchFamily="49" charset="0"/>
+                <a:cs typeface="Consolas" panose="020B0609020204030204" pitchFamily="49" charset="0"/>
+              </a:rPr>
+              <a:t>the</a:t>
+            </a:r>
+            <a:r>
+              <a:rPr kumimoji="0" lang="de-DE" altLang="de-DE" sz="1100" b="0" i="0" u="none" strike="noStrike" cap="none" normalizeH="0" baseline="0" dirty="0" smtClean="0">
+                <a:ln>
+                  <a:noFill/>
+                </a:ln>
+                <a:solidFill>
+                  <a:srgbClr val="A31515"/>
+                </a:solidFill>
+                <a:effectLst/>
+                <a:latin typeface="Consolas" panose="020B0609020204030204" pitchFamily="49" charset="0"/>
+                <a:cs typeface="Consolas" panose="020B0609020204030204" pitchFamily="49" charset="0"/>
+              </a:rPr>
+              <a:t> </a:t>
+            </a:r>
+            <a:r>
+              <a:rPr kumimoji="0" lang="de-DE" altLang="de-DE" sz="1200" b="0" i="0" u="none" strike="noStrike" cap="none" normalizeH="0" baseline="0" dirty="0" err="1" smtClean="0">
+                <a:ln>
+                  <a:noFill/>
+                </a:ln>
+                <a:solidFill>
+                  <a:srgbClr val="A31515"/>
+                </a:solidFill>
+                <a:effectLst/>
+                <a:latin typeface="Consolas" panose="020B0609020204030204" pitchFamily="49" charset="0"/>
+                <a:cs typeface="Consolas" panose="020B0609020204030204" pitchFamily="49" charset="0"/>
+              </a:rPr>
+              <a:t>population</a:t>
+            </a:r>
+            <a:r>
+              <a:rPr kumimoji="0" lang="de-DE" altLang="de-DE" sz="1100" b="0" i="0" u="none" strike="noStrike" cap="none" normalizeH="0" baseline="0" dirty="0" smtClean="0">
+                <a:ln>
+                  <a:noFill/>
+                </a:ln>
+                <a:solidFill>
+                  <a:srgbClr val="A31515"/>
+                </a:solidFill>
+                <a:effectLst/>
+                <a:latin typeface="Consolas" panose="020B0609020204030204" pitchFamily="49" charset="0"/>
+                <a:cs typeface="Consolas" panose="020B0609020204030204" pitchFamily="49" charset="0"/>
+              </a:rPr>
+              <a:t> </a:t>
+            </a:r>
+            <a:r>
+              <a:rPr kumimoji="0" lang="de-DE" altLang="de-DE" sz="1100" b="0" i="0" u="none" strike="noStrike" cap="none" normalizeH="0" baseline="0" dirty="0" err="1" smtClean="0">
+                <a:ln>
+                  <a:noFill/>
+                </a:ln>
+                <a:solidFill>
+                  <a:srgbClr val="A31515"/>
+                </a:solidFill>
+                <a:effectLst/>
+                <a:latin typeface="Consolas" panose="020B0609020204030204" pitchFamily="49" charset="0"/>
+                <a:cs typeface="Consolas" panose="020B0609020204030204" pitchFamily="49" charset="0"/>
+              </a:rPr>
+              <a:t>of</a:t>
+            </a:r>
+            <a:r>
+              <a:rPr kumimoji="0" lang="de-DE" altLang="de-DE" sz="1100" b="0" i="0" u="none" strike="noStrike" cap="none" normalizeH="0" baseline="0" dirty="0" smtClean="0">
+                <a:ln>
+                  <a:noFill/>
+                </a:ln>
+                <a:solidFill>
+                  <a:srgbClr val="A31515"/>
+                </a:solidFill>
+                <a:effectLst/>
+                <a:latin typeface="Consolas" panose="020B0609020204030204" pitchFamily="49" charset="0"/>
+                <a:cs typeface="Consolas" panose="020B0609020204030204" pitchFamily="49" charset="0"/>
+              </a:rPr>
+              <a:t> </a:t>
+            </a:r>
+            <a:r>
+              <a:rPr kumimoji="0" lang="de-DE" altLang="de-DE" sz="1100" b="0" i="0" u="none" strike="noStrike" cap="none" normalizeH="0" baseline="0" dirty="0" err="1" smtClean="0">
+                <a:ln>
+                  <a:noFill/>
+                </a:ln>
+                <a:solidFill>
+                  <a:srgbClr val="A31515"/>
+                </a:solidFill>
+                <a:effectLst/>
+                <a:latin typeface="Consolas" panose="020B0609020204030204" pitchFamily="49" charset="0"/>
+                <a:cs typeface="Consolas" panose="020B0609020204030204" pitchFamily="49" charset="0"/>
+              </a:rPr>
+              <a:t>solutions</a:t>
+            </a:r>
+            <a:r>
+              <a:rPr kumimoji="0" lang="de-DE" altLang="de-DE" sz="1100" b="0" i="0" u="none" strike="noStrike" cap="none" normalizeH="0" baseline="0" dirty="0" smtClean="0">
+                <a:ln>
+                  <a:noFill/>
+                </a:ln>
+                <a:solidFill>
+                  <a:srgbClr val="A31515"/>
+                </a:solidFill>
+                <a:effectLst/>
+                <a:latin typeface="Consolas" panose="020B0609020204030204" pitchFamily="49" charset="0"/>
+                <a:cs typeface="Consolas" panose="020B0609020204030204" pitchFamily="49" charset="0"/>
+              </a:rPr>
+              <a:t>."</a:t>
+            </a:r>
+            <a:r>
+              <a:rPr kumimoji="0" lang="de-DE" altLang="de-DE" sz="1100" b="0" i="0" u="none" strike="noStrike" cap="none" normalizeH="0" baseline="0" dirty="0" smtClean="0">
+                <a:ln>
+                  <a:noFill/>
+                </a:ln>
+                <a:solidFill>
+                  <a:srgbClr val="000000"/>
+                </a:solidFill>
+                <a:effectLst/>
+                <a:latin typeface="Consolas" panose="020B0609020204030204" pitchFamily="49" charset="0"/>
+                <a:cs typeface="Consolas" panose="020B0609020204030204" pitchFamily="49" charset="0"/>
+              </a:rPr>
+              <a:t>, </a:t>
+            </a:r>
+            <a:r>
+              <a:rPr kumimoji="0" lang="de-DE" altLang="de-DE" sz="1100" b="0" i="0" u="none" strike="noStrike" cap="none" normalizeH="0" baseline="0" dirty="0" err="1" smtClean="0">
+                <a:ln>
+                  <a:noFill/>
+                </a:ln>
+                <a:solidFill>
+                  <a:srgbClr val="0000FF"/>
+                </a:solidFill>
+                <a:effectLst/>
+                <a:latin typeface="Consolas" panose="020B0609020204030204" pitchFamily="49" charset="0"/>
+                <a:cs typeface="Consolas" panose="020B0609020204030204" pitchFamily="49" charset="0"/>
+              </a:rPr>
+              <a:t>new</a:t>
+            </a:r>
+            <a:r>
+              <a:rPr kumimoji="0" lang="de-DE" altLang="de-DE" sz="1100" b="0" i="0" u="none" strike="noStrike" cap="none" normalizeH="0" baseline="0" dirty="0" smtClean="0">
+                <a:ln>
+                  <a:noFill/>
+                </a:ln>
+                <a:solidFill>
+                  <a:srgbClr val="000000"/>
+                </a:solidFill>
+                <a:effectLst/>
+                <a:latin typeface="Consolas" panose="020B0609020204030204" pitchFamily="49" charset="0"/>
+                <a:cs typeface="Consolas" panose="020B0609020204030204" pitchFamily="49" charset="0"/>
+              </a:rPr>
+              <a:t> </a:t>
+            </a:r>
+            <a:r>
+              <a:rPr kumimoji="0" lang="de-DE" altLang="de-DE" sz="1100" b="0" i="0" u="none" strike="noStrike" cap="none" normalizeH="0" baseline="0" dirty="0" err="1" smtClean="0">
+                <a:ln>
+                  <a:noFill/>
+                </a:ln>
+                <a:solidFill>
+                  <a:srgbClr val="2B91AF"/>
+                </a:solidFill>
+                <a:effectLst/>
+                <a:latin typeface="Consolas" panose="020B0609020204030204" pitchFamily="49" charset="0"/>
+                <a:cs typeface="Consolas" panose="020B0609020204030204" pitchFamily="49" charset="0"/>
+              </a:rPr>
+              <a:t>IntValue</a:t>
+            </a:r>
+            <a:r>
+              <a:rPr kumimoji="0" lang="de-DE" altLang="de-DE" sz="1100" b="0" i="0" u="none" strike="noStrike" cap="none" normalizeH="0" baseline="0" dirty="0" smtClean="0">
+                <a:ln>
+                  <a:noFill/>
+                </a:ln>
+                <a:solidFill>
+                  <a:srgbClr val="000000"/>
+                </a:solidFill>
+                <a:effectLst/>
+                <a:latin typeface="Consolas" panose="020B0609020204030204" pitchFamily="49" charset="0"/>
+                <a:cs typeface="Consolas" panose="020B0609020204030204" pitchFamily="49" charset="0"/>
+              </a:rPr>
+              <a:t>(100))); </a:t>
+            </a:r>
+            <a:endParaRPr kumimoji="0" lang="de-DE" altLang="de-DE" sz="2800" b="0" i="0" u="none" strike="noStrike" cap="none" normalizeH="0" baseline="0" dirty="0" smtClean="0">
+              <a:ln>
+                <a:noFill/>
+              </a:ln>
+              <a:solidFill>
+                <a:schemeClr val="tx1"/>
+              </a:solidFill>
+              <a:effectLst/>
+              <a:latin typeface="Arial" panose="020B0604020202020204" pitchFamily="34" charset="0"/>
+            </a:endParaRPr>
+          </a:p>
+        </p:txBody>
+      </p:sp>
       <p:pic>
         <p:nvPicPr>
           <p:cNvPr id="7" name="Grafik 6"/>
@@ -21157,936 +22022,6 @@
           </a:prstGeom>
         </p:spPr>
       </p:pic>
-      <p:sp>
-        <p:nvSpPr>
-          <p:cNvPr id="8" name="Rectangle 1"/>
-          <p:cNvSpPr>
-            <a:spLocks noChangeArrowheads="1"/>
-          </p:cNvSpPr>
-          <p:nvPr/>
-        </p:nvSpPr>
-        <p:spPr bwMode="auto">
-          <a:xfrm>
-            <a:off x="604402" y="3194496"/>
-            <a:ext cx="6200328" cy="461665"/>
-          </a:xfrm>
-          <a:prstGeom prst="rect">
-            <a:avLst/>
-          </a:prstGeom>
-          <a:solidFill>
-            <a:srgbClr val="FFFFFF"/>
-          </a:solidFill>
-          <a:ln>
-            <a:noFill/>
-          </a:ln>
-          <a:effectLst/>
-          <a:extLst>
-            <a:ext uri="{91240B29-F687-4F45-9708-019B960494DF}">
-              <a14:hiddenLine xmlns:a14="http://schemas.microsoft.com/office/drawing/2010/main" w="9525">
-                <a:solidFill>
-                  <a:schemeClr val="tx1"/>
-                </a:solidFill>
-                <a:miter lim="800000"/>
-                <a:headEnd/>
-                <a:tailEnd/>
-              </a14:hiddenLine>
-            </a:ext>
-            <a:ext uri="{AF507438-7753-43E0-B8FC-AC1667EBCBE1}">
-              <a14:hiddenEffects xmlns:a14="http://schemas.microsoft.com/office/drawing/2010/main">
-                <a:effectLst>
-                  <a:outerShdw dist="35921" dir="2700000" algn="ctr" rotWithShape="0">
-                    <a:schemeClr val="bg2"/>
-                  </a:outerShdw>
-                </a:effectLst>
-              </a14:hiddenEffects>
-            </a:ext>
-          </a:extLst>
-        </p:spPr>
-        <p:txBody>
-          <a:bodyPr vert="horz" wrap="square" lIns="91440" tIns="45720" rIns="91440" bIns="45720" numCol="1" anchor="ctr" anchorCtr="0" compatLnSpc="1">
-            <a:prstTxWarp prst="textNoShape">
-              <a:avLst/>
-            </a:prstTxWarp>
-            <a:spAutoFit/>
-          </a:bodyPr>
-          <a:lstStyle/>
-          <a:p>
-            <a:pPr marL="0" marR="0" lvl="0" indent="0" algn="l" defTabSz="914400" rtl="0" eaLnBrk="0" fontAlgn="base" latinLnBrk="0" hangingPunct="0">
-              <a:lnSpc>
-                <a:spcPct val="100000"/>
-              </a:lnSpc>
-              <a:spcBef>
-                <a:spcPct val="0"/>
-              </a:spcBef>
-              <a:spcAft>
-                <a:spcPct val="0"/>
-              </a:spcAft>
-              <a:buClrTx/>
-              <a:buSzTx/>
-              <a:buFontTx/>
-              <a:buNone/>
-              <a:tabLst/>
-            </a:pPr>
-            <a:r>
-              <a:rPr kumimoji="0" lang="de-DE" altLang="de-DE" sz="1200" b="0" i="0" u="none" strike="noStrike" cap="none" normalizeH="0" baseline="0" dirty="0" err="1" smtClean="0">
-                <a:ln>
-                  <a:noFill/>
-                </a:ln>
-                <a:solidFill>
-                  <a:srgbClr val="000000"/>
-                </a:solidFill>
-                <a:effectLst/>
-                <a:latin typeface="Consolas" panose="020B0609020204030204" pitchFamily="49" charset="0"/>
-                <a:cs typeface="Consolas" panose="020B0609020204030204" pitchFamily="49" charset="0"/>
-              </a:rPr>
-              <a:t>Parameters.Add</a:t>
-            </a:r>
-            <a:r>
-              <a:rPr kumimoji="0" lang="de-DE" altLang="de-DE" sz="1200" b="0" i="0" u="none" strike="noStrike" cap="none" normalizeH="0" baseline="0" dirty="0" smtClean="0">
-                <a:ln>
-                  <a:noFill/>
-                </a:ln>
-                <a:solidFill>
-                  <a:srgbClr val="000000"/>
-                </a:solidFill>
-                <a:effectLst/>
-                <a:latin typeface="Consolas" panose="020B0609020204030204" pitchFamily="49" charset="0"/>
-                <a:cs typeface="Consolas" panose="020B0609020204030204" pitchFamily="49" charset="0"/>
-              </a:rPr>
-              <a:t>(</a:t>
-            </a:r>
-            <a:r>
-              <a:rPr kumimoji="0" lang="de-DE" altLang="de-DE" sz="1200" b="0" i="0" u="none" strike="noStrike" cap="none" normalizeH="0" baseline="0" dirty="0" err="1" smtClean="0">
-                <a:ln>
-                  <a:noFill/>
-                </a:ln>
-                <a:solidFill>
-                  <a:srgbClr val="0000FF"/>
-                </a:solidFill>
-                <a:effectLst/>
-                <a:latin typeface="Consolas" panose="020B0609020204030204" pitchFamily="49" charset="0"/>
-                <a:cs typeface="Consolas" panose="020B0609020204030204" pitchFamily="49" charset="0"/>
-              </a:rPr>
-              <a:t>new</a:t>
-            </a:r>
-            <a:r>
-              <a:rPr kumimoji="0" lang="de-DE" altLang="de-DE" sz="1200" b="0" i="0" u="none" strike="noStrike" cap="none" normalizeH="0" baseline="0" dirty="0" smtClean="0">
-                <a:ln>
-                  <a:noFill/>
-                </a:ln>
-                <a:solidFill>
-                  <a:srgbClr val="000000"/>
-                </a:solidFill>
-                <a:effectLst/>
-                <a:latin typeface="Consolas" panose="020B0609020204030204" pitchFamily="49" charset="0"/>
-                <a:cs typeface="Consolas" panose="020B0609020204030204" pitchFamily="49" charset="0"/>
-              </a:rPr>
-              <a:t> </a:t>
-            </a:r>
-            <a:r>
-              <a:rPr kumimoji="0" lang="de-DE" altLang="de-DE" sz="1200" b="0" i="0" u="none" strike="noStrike" cap="none" normalizeH="0" baseline="0" dirty="0" err="1" smtClean="0">
-                <a:ln>
-                  <a:noFill/>
-                </a:ln>
-                <a:solidFill>
-                  <a:srgbClr val="2B91AF"/>
-                </a:solidFill>
-                <a:effectLst/>
-                <a:latin typeface="Consolas" panose="020B0609020204030204" pitchFamily="49" charset="0"/>
-                <a:cs typeface="Consolas" panose="020B0609020204030204" pitchFamily="49" charset="0"/>
-              </a:rPr>
-              <a:t>ConstrainedValueParameter</a:t>
-            </a:r>
-            <a:r>
-              <a:rPr kumimoji="0" lang="de-DE" altLang="de-DE" sz="1200" b="0" i="0" u="none" strike="noStrike" cap="none" normalizeH="0" baseline="0" dirty="0" smtClean="0">
-                <a:ln>
-                  <a:noFill/>
-                </a:ln>
-                <a:solidFill>
-                  <a:srgbClr val="000000"/>
-                </a:solidFill>
-                <a:effectLst/>
-                <a:latin typeface="Consolas" panose="020B0609020204030204" pitchFamily="49" charset="0"/>
-                <a:cs typeface="Consolas" panose="020B0609020204030204" pitchFamily="49" charset="0"/>
-              </a:rPr>
-              <a:t>&lt;</a:t>
-            </a:r>
-            <a:r>
-              <a:rPr kumimoji="0" lang="de-DE" altLang="de-DE" sz="1200" b="0" i="0" u="none" strike="noStrike" cap="none" normalizeH="0" baseline="0" dirty="0" err="1" smtClean="0">
-                <a:ln>
-                  <a:noFill/>
-                </a:ln>
-                <a:solidFill>
-                  <a:srgbClr val="2B91AF"/>
-                </a:solidFill>
-                <a:effectLst/>
-                <a:latin typeface="Consolas" panose="020B0609020204030204" pitchFamily="49" charset="0"/>
-                <a:cs typeface="Consolas" panose="020B0609020204030204" pitchFamily="49" charset="0"/>
-              </a:rPr>
-              <a:t>ICrossover</a:t>
-            </a:r>
-            <a:r>
-              <a:rPr kumimoji="0" lang="de-DE" altLang="de-DE" sz="1200" b="0" i="0" u="none" strike="noStrike" cap="none" normalizeH="0" baseline="0" dirty="0" smtClean="0">
-                <a:ln>
-                  <a:noFill/>
-                </a:ln>
-                <a:solidFill>
-                  <a:srgbClr val="000000"/>
-                </a:solidFill>
-                <a:effectLst/>
-                <a:latin typeface="Consolas" panose="020B0609020204030204" pitchFamily="49" charset="0"/>
-                <a:cs typeface="Consolas" panose="020B0609020204030204" pitchFamily="49" charset="0"/>
-              </a:rPr>
-              <a:t>&gt;(</a:t>
-            </a:r>
-            <a:r>
-              <a:rPr kumimoji="0" lang="de-DE" altLang="de-DE" sz="1200" b="0" i="0" u="none" strike="noStrike" cap="none" normalizeH="0" baseline="0" dirty="0" smtClean="0">
-                <a:ln>
-                  <a:noFill/>
-                </a:ln>
-                <a:solidFill>
-                  <a:srgbClr val="A31515"/>
-                </a:solidFill>
-                <a:effectLst/>
-                <a:latin typeface="Consolas" panose="020B0609020204030204" pitchFamily="49" charset="0"/>
-                <a:cs typeface="Consolas" panose="020B0609020204030204" pitchFamily="49" charset="0"/>
-              </a:rPr>
-              <a:t>"Crossover"</a:t>
-            </a:r>
-            <a:r>
-              <a:rPr kumimoji="0" lang="de-DE" altLang="de-DE" sz="1200" b="0" i="0" u="none" strike="noStrike" cap="none" normalizeH="0" baseline="0" dirty="0" smtClean="0">
-                <a:ln>
-                  <a:noFill/>
-                </a:ln>
-                <a:solidFill>
-                  <a:srgbClr val="000000"/>
-                </a:solidFill>
-                <a:effectLst/>
-                <a:latin typeface="Consolas" panose="020B0609020204030204" pitchFamily="49" charset="0"/>
-                <a:cs typeface="Consolas" panose="020B0609020204030204" pitchFamily="49" charset="0"/>
-              </a:rPr>
-              <a:t>, </a:t>
-            </a:r>
-          </a:p>
-          <a:p>
-            <a:pPr marL="0" marR="0" lvl="0" indent="0" algn="l" defTabSz="914400" rtl="0" eaLnBrk="0" fontAlgn="base" latinLnBrk="0" hangingPunct="0">
-              <a:lnSpc>
-                <a:spcPct val="100000"/>
-              </a:lnSpc>
-              <a:spcBef>
-                <a:spcPct val="0"/>
-              </a:spcBef>
-              <a:spcAft>
-                <a:spcPct val="0"/>
-              </a:spcAft>
-              <a:buClrTx/>
-              <a:buSzTx/>
-              <a:buFontTx/>
-              <a:buNone/>
-              <a:tabLst/>
-            </a:pPr>
-            <a:r>
-              <a:rPr kumimoji="0" lang="de-DE" altLang="de-DE" sz="1200" b="0" i="0" u="none" strike="noStrike" cap="none" normalizeH="0" baseline="0" dirty="0" smtClean="0">
-                <a:ln>
-                  <a:noFill/>
-                </a:ln>
-                <a:solidFill>
-                  <a:srgbClr val="A31515"/>
-                </a:solidFill>
-                <a:effectLst/>
-                <a:latin typeface="Consolas" panose="020B0609020204030204" pitchFamily="49" charset="0"/>
-                <a:cs typeface="Consolas" panose="020B0609020204030204" pitchFamily="49" charset="0"/>
-              </a:rPr>
-              <a:t>"The </a:t>
-            </a:r>
-            <a:r>
-              <a:rPr kumimoji="0" lang="de-DE" altLang="de-DE" sz="1200" b="0" i="0" u="none" strike="noStrike" cap="none" normalizeH="0" baseline="0" dirty="0" err="1" smtClean="0">
-                <a:ln>
-                  <a:noFill/>
-                </a:ln>
-                <a:solidFill>
-                  <a:srgbClr val="A31515"/>
-                </a:solidFill>
-                <a:effectLst/>
-                <a:latin typeface="Consolas" panose="020B0609020204030204" pitchFamily="49" charset="0"/>
-                <a:cs typeface="Consolas" panose="020B0609020204030204" pitchFamily="49" charset="0"/>
-              </a:rPr>
-              <a:t>operator</a:t>
-            </a:r>
-            <a:r>
-              <a:rPr kumimoji="0" lang="de-DE" altLang="de-DE" sz="1200" b="0" i="0" u="none" strike="noStrike" cap="none" normalizeH="0" baseline="0" dirty="0" smtClean="0">
-                <a:ln>
-                  <a:noFill/>
-                </a:ln>
-                <a:solidFill>
-                  <a:srgbClr val="A31515"/>
-                </a:solidFill>
-                <a:effectLst/>
-                <a:latin typeface="Consolas" panose="020B0609020204030204" pitchFamily="49" charset="0"/>
-                <a:cs typeface="Consolas" panose="020B0609020204030204" pitchFamily="49" charset="0"/>
-              </a:rPr>
-              <a:t> </a:t>
-            </a:r>
-            <a:r>
-              <a:rPr kumimoji="0" lang="de-DE" altLang="de-DE" sz="1200" b="0" i="0" u="none" strike="noStrike" cap="none" normalizeH="0" baseline="0" dirty="0" err="1" smtClean="0">
-                <a:ln>
-                  <a:noFill/>
-                </a:ln>
-                <a:solidFill>
-                  <a:srgbClr val="A31515"/>
-                </a:solidFill>
-                <a:effectLst/>
-                <a:latin typeface="Consolas" panose="020B0609020204030204" pitchFamily="49" charset="0"/>
-                <a:cs typeface="Consolas" panose="020B0609020204030204" pitchFamily="49" charset="0"/>
-              </a:rPr>
-              <a:t>used</a:t>
-            </a:r>
-            <a:r>
-              <a:rPr kumimoji="0" lang="de-DE" altLang="de-DE" sz="1200" b="0" i="0" u="none" strike="noStrike" cap="none" normalizeH="0" baseline="0" dirty="0" smtClean="0">
-                <a:ln>
-                  <a:noFill/>
-                </a:ln>
-                <a:solidFill>
-                  <a:srgbClr val="A31515"/>
-                </a:solidFill>
-                <a:effectLst/>
-                <a:latin typeface="Consolas" panose="020B0609020204030204" pitchFamily="49" charset="0"/>
-                <a:cs typeface="Consolas" panose="020B0609020204030204" pitchFamily="49" charset="0"/>
-              </a:rPr>
-              <a:t> </a:t>
-            </a:r>
-            <a:r>
-              <a:rPr kumimoji="0" lang="de-DE" altLang="de-DE" sz="1200" b="0" i="0" u="none" strike="noStrike" cap="none" normalizeH="0" baseline="0" dirty="0" err="1" smtClean="0">
-                <a:ln>
-                  <a:noFill/>
-                </a:ln>
-                <a:solidFill>
-                  <a:srgbClr val="A31515"/>
-                </a:solidFill>
-                <a:effectLst/>
-                <a:latin typeface="Consolas" panose="020B0609020204030204" pitchFamily="49" charset="0"/>
-                <a:cs typeface="Consolas" panose="020B0609020204030204" pitchFamily="49" charset="0"/>
-              </a:rPr>
-              <a:t>to</a:t>
-            </a:r>
-            <a:r>
-              <a:rPr kumimoji="0" lang="de-DE" altLang="de-DE" sz="1200" b="0" i="0" u="none" strike="noStrike" cap="none" normalizeH="0" baseline="0" dirty="0" smtClean="0">
-                <a:ln>
-                  <a:noFill/>
-                </a:ln>
-                <a:solidFill>
-                  <a:srgbClr val="A31515"/>
-                </a:solidFill>
-                <a:effectLst/>
-                <a:latin typeface="Consolas" panose="020B0609020204030204" pitchFamily="49" charset="0"/>
-                <a:cs typeface="Consolas" panose="020B0609020204030204" pitchFamily="49" charset="0"/>
-              </a:rPr>
-              <a:t> </a:t>
-            </a:r>
-            <a:r>
-              <a:rPr kumimoji="0" lang="de-DE" altLang="de-DE" sz="1200" b="0" i="0" u="none" strike="noStrike" cap="none" normalizeH="0" baseline="0" dirty="0" err="1" smtClean="0">
-                <a:ln>
-                  <a:noFill/>
-                </a:ln>
-                <a:solidFill>
-                  <a:srgbClr val="A31515"/>
-                </a:solidFill>
-                <a:effectLst/>
-                <a:latin typeface="Consolas" panose="020B0609020204030204" pitchFamily="49" charset="0"/>
-                <a:cs typeface="Consolas" panose="020B0609020204030204" pitchFamily="49" charset="0"/>
-              </a:rPr>
-              <a:t>cross</a:t>
-            </a:r>
-            <a:r>
-              <a:rPr kumimoji="0" lang="de-DE" altLang="de-DE" sz="1200" b="0" i="0" u="none" strike="noStrike" cap="none" normalizeH="0" baseline="0" dirty="0" smtClean="0">
-                <a:ln>
-                  <a:noFill/>
-                </a:ln>
-                <a:solidFill>
-                  <a:srgbClr val="A31515"/>
-                </a:solidFill>
-                <a:effectLst/>
-                <a:latin typeface="Consolas" panose="020B0609020204030204" pitchFamily="49" charset="0"/>
-                <a:cs typeface="Consolas" panose="020B0609020204030204" pitchFamily="49" charset="0"/>
-              </a:rPr>
-              <a:t> </a:t>
-            </a:r>
-            <a:r>
-              <a:rPr kumimoji="0" lang="de-DE" altLang="de-DE" sz="1200" b="0" i="0" u="none" strike="noStrike" cap="none" normalizeH="0" baseline="0" dirty="0" err="1" smtClean="0">
-                <a:ln>
-                  <a:noFill/>
-                </a:ln>
-                <a:solidFill>
-                  <a:srgbClr val="A31515"/>
-                </a:solidFill>
-                <a:effectLst/>
-                <a:latin typeface="Consolas" panose="020B0609020204030204" pitchFamily="49" charset="0"/>
-                <a:cs typeface="Consolas" panose="020B0609020204030204" pitchFamily="49" charset="0"/>
-              </a:rPr>
-              <a:t>solutions</a:t>
-            </a:r>
-            <a:r>
-              <a:rPr kumimoji="0" lang="de-DE" altLang="de-DE" sz="1200" b="0" i="0" u="none" strike="noStrike" cap="none" normalizeH="0" baseline="0" dirty="0" smtClean="0">
-                <a:ln>
-                  <a:noFill/>
-                </a:ln>
-                <a:solidFill>
-                  <a:srgbClr val="A31515"/>
-                </a:solidFill>
-                <a:effectLst/>
-                <a:latin typeface="Consolas" panose="020B0609020204030204" pitchFamily="49" charset="0"/>
-                <a:cs typeface="Consolas" panose="020B0609020204030204" pitchFamily="49" charset="0"/>
-              </a:rPr>
-              <a:t>."</a:t>
-            </a:r>
-            <a:r>
-              <a:rPr kumimoji="0" lang="de-DE" altLang="de-DE" sz="1200" b="0" i="0" u="none" strike="noStrike" cap="none" normalizeH="0" baseline="0" dirty="0" smtClean="0">
-                <a:ln>
-                  <a:noFill/>
-                </a:ln>
-                <a:solidFill>
-                  <a:srgbClr val="000000"/>
-                </a:solidFill>
-                <a:effectLst/>
-                <a:latin typeface="Consolas" panose="020B0609020204030204" pitchFamily="49" charset="0"/>
-                <a:cs typeface="Consolas" panose="020B0609020204030204" pitchFamily="49" charset="0"/>
-              </a:rPr>
-              <a:t>)); </a:t>
-            </a:r>
-            <a:endParaRPr kumimoji="0" lang="de-DE" altLang="de-DE" sz="3200" b="0" i="0" u="none" strike="noStrike" cap="none" normalizeH="0" baseline="0" dirty="0" smtClean="0">
-              <a:ln>
-                <a:noFill/>
-              </a:ln>
-              <a:solidFill>
-                <a:schemeClr val="tx1"/>
-              </a:solidFill>
-              <a:effectLst/>
-              <a:latin typeface="Arial" panose="020B0604020202020204" pitchFamily="34" charset="0"/>
-            </a:endParaRPr>
-          </a:p>
-        </p:txBody>
-      </p:sp>
-      <p:sp>
-        <p:nvSpPr>
-          <p:cNvPr id="9" name="Rectangle 2"/>
-          <p:cNvSpPr>
-            <a:spLocks noChangeArrowheads="1"/>
-          </p:cNvSpPr>
-          <p:nvPr/>
-        </p:nvSpPr>
-        <p:spPr bwMode="auto">
-          <a:xfrm>
-            <a:off x="604402" y="4850347"/>
-            <a:ext cx="6200328" cy="446276"/>
-          </a:xfrm>
-          <a:prstGeom prst="rect">
-            <a:avLst/>
-          </a:prstGeom>
-          <a:solidFill>
-            <a:srgbClr val="FFFFFF"/>
-          </a:solidFill>
-          <a:ln>
-            <a:noFill/>
-          </a:ln>
-          <a:effectLst/>
-          <a:extLst>
-            <a:ext uri="{91240B29-F687-4F45-9708-019B960494DF}">
-              <a14:hiddenLine xmlns:a14="http://schemas.microsoft.com/office/drawing/2010/main" w="9525">
-                <a:solidFill>
-                  <a:schemeClr val="tx1"/>
-                </a:solidFill>
-                <a:miter lim="800000"/>
-                <a:headEnd/>
-                <a:tailEnd/>
-              </a14:hiddenLine>
-            </a:ext>
-            <a:ext uri="{AF507438-7753-43E0-B8FC-AC1667EBCBE1}">
-              <a14:hiddenEffects xmlns:a14="http://schemas.microsoft.com/office/drawing/2010/main">
-                <a:effectLst>
-                  <a:outerShdw dist="35921" dir="2700000" algn="ctr" rotWithShape="0">
-                    <a:schemeClr val="bg2"/>
-                  </a:outerShdw>
-                </a:effectLst>
-              </a14:hiddenEffects>
-            </a:ext>
-          </a:extLst>
-        </p:spPr>
-        <p:txBody>
-          <a:bodyPr vert="horz" wrap="square" lIns="91440" tIns="45720" rIns="91440" bIns="45720" numCol="1" anchor="ctr" anchorCtr="0" compatLnSpc="1">
-            <a:prstTxWarp prst="textNoShape">
-              <a:avLst/>
-            </a:prstTxWarp>
-            <a:spAutoFit/>
-          </a:bodyPr>
-          <a:lstStyle/>
-          <a:p>
-            <a:pPr marL="0" marR="0" lvl="0" indent="0" algn="l" defTabSz="914400" rtl="0" eaLnBrk="0" fontAlgn="base" latinLnBrk="0" hangingPunct="0">
-              <a:lnSpc>
-                <a:spcPct val="100000"/>
-              </a:lnSpc>
-              <a:spcBef>
-                <a:spcPct val="0"/>
-              </a:spcBef>
-              <a:spcAft>
-                <a:spcPct val="0"/>
-              </a:spcAft>
-              <a:buClrTx/>
-              <a:buSzTx/>
-              <a:buFontTx/>
-              <a:buNone/>
-              <a:tabLst/>
-            </a:pPr>
-            <a:r>
-              <a:rPr kumimoji="0" lang="de-DE" altLang="de-DE" sz="1100" b="0" i="0" u="none" strike="noStrike" cap="none" normalizeH="0" baseline="0" dirty="0" err="1" smtClean="0">
-                <a:ln>
-                  <a:noFill/>
-                </a:ln>
-                <a:solidFill>
-                  <a:srgbClr val="000000"/>
-                </a:solidFill>
-                <a:effectLst/>
-                <a:latin typeface="Consolas" panose="020B0609020204030204" pitchFamily="49" charset="0"/>
-                <a:cs typeface="Consolas" panose="020B0609020204030204" pitchFamily="49" charset="0"/>
-              </a:rPr>
-              <a:t>Parameters.Add</a:t>
-            </a:r>
-            <a:r>
-              <a:rPr kumimoji="0" lang="de-DE" altLang="de-DE" sz="1100" b="0" i="0" u="none" strike="noStrike" cap="none" normalizeH="0" baseline="0" dirty="0" smtClean="0">
-                <a:ln>
-                  <a:noFill/>
-                </a:ln>
-                <a:solidFill>
-                  <a:srgbClr val="000000"/>
-                </a:solidFill>
-                <a:effectLst/>
-                <a:latin typeface="Consolas" panose="020B0609020204030204" pitchFamily="49" charset="0"/>
-                <a:cs typeface="Consolas" panose="020B0609020204030204" pitchFamily="49" charset="0"/>
-              </a:rPr>
-              <a:t>(</a:t>
-            </a:r>
-            <a:r>
-              <a:rPr kumimoji="0" lang="de-DE" altLang="de-DE" sz="1100" b="0" i="0" u="none" strike="noStrike" cap="none" normalizeH="0" baseline="0" dirty="0" err="1" smtClean="0">
-                <a:ln>
-                  <a:noFill/>
-                </a:ln>
-                <a:solidFill>
-                  <a:srgbClr val="0000FF"/>
-                </a:solidFill>
-                <a:effectLst/>
-                <a:latin typeface="Consolas" panose="020B0609020204030204" pitchFamily="49" charset="0"/>
-                <a:cs typeface="Consolas" panose="020B0609020204030204" pitchFamily="49" charset="0"/>
-              </a:rPr>
-              <a:t>new</a:t>
-            </a:r>
-            <a:r>
-              <a:rPr kumimoji="0" lang="de-DE" altLang="de-DE" sz="1100" b="0" i="0" u="none" strike="noStrike" cap="none" normalizeH="0" baseline="0" dirty="0" smtClean="0">
-                <a:ln>
-                  <a:noFill/>
-                </a:ln>
-                <a:solidFill>
-                  <a:srgbClr val="000000"/>
-                </a:solidFill>
-                <a:effectLst/>
-                <a:latin typeface="Consolas" panose="020B0609020204030204" pitchFamily="49" charset="0"/>
-                <a:cs typeface="Consolas" panose="020B0609020204030204" pitchFamily="49" charset="0"/>
-              </a:rPr>
-              <a:t> </a:t>
-            </a:r>
-            <a:r>
-              <a:rPr kumimoji="0" lang="de-DE" altLang="de-DE" sz="1100" b="0" i="0" u="none" strike="noStrike" cap="none" normalizeH="0" baseline="0" dirty="0" err="1" smtClean="0">
-                <a:ln>
-                  <a:noFill/>
-                </a:ln>
-                <a:solidFill>
-                  <a:srgbClr val="2B91AF"/>
-                </a:solidFill>
-                <a:effectLst/>
-                <a:latin typeface="Consolas" panose="020B0609020204030204" pitchFamily="49" charset="0"/>
-                <a:cs typeface="Consolas" panose="020B0609020204030204" pitchFamily="49" charset="0"/>
-              </a:rPr>
-              <a:t>ValueParameter</a:t>
-            </a:r>
-            <a:r>
-              <a:rPr kumimoji="0" lang="de-DE" altLang="de-DE" sz="1100" b="0" i="0" u="none" strike="noStrike" cap="none" normalizeH="0" baseline="0" dirty="0" smtClean="0">
-                <a:ln>
-                  <a:noFill/>
-                </a:ln>
-                <a:solidFill>
-                  <a:srgbClr val="000000"/>
-                </a:solidFill>
-                <a:effectLst/>
-                <a:latin typeface="Consolas" panose="020B0609020204030204" pitchFamily="49" charset="0"/>
-                <a:cs typeface="Consolas" panose="020B0609020204030204" pitchFamily="49" charset="0"/>
-              </a:rPr>
-              <a:t>&lt;</a:t>
-            </a:r>
-            <a:r>
-              <a:rPr kumimoji="0" lang="de-DE" altLang="de-DE" sz="1100" b="0" i="0" u="none" strike="noStrike" cap="none" normalizeH="0" baseline="0" dirty="0" err="1" smtClean="0">
-                <a:ln>
-                  <a:noFill/>
-                </a:ln>
-                <a:solidFill>
-                  <a:srgbClr val="2B91AF"/>
-                </a:solidFill>
-                <a:effectLst/>
-                <a:latin typeface="Consolas" panose="020B0609020204030204" pitchFamily="49" charset="0"/>
-                <a:cs typeface="Consolas" panose="020B0609020204030204" pitchFamily="49" charset="0"/>
-              </a:rPr>
-              <a:t>IntValue</a:t>
-            </a:r>
-            <a:r>
-              <a:rPr kumimoji="0" lang="de-DE" altLang="de-DE" sz="1100" b="0" i="0" u="none" strike="noStrike" cap="none" normalizeH="0" baseline="0" dirty="0" smtClean="0">
-                <a:ln>
-                  <a:noFill/>
-                </a:ln>
-                <a:solidFill>
-                  <a:srgbClr val="000000"/>
-                </a:solidFill>
-                <a:effectLst/>
-                <a:latin typeface="Consolas" panose="020B0609020204030204" pitchFamily="49" charset="0"/>
-                <a:cs typeface="Consolas" panose="020B0609020204030204" pitchFamily="49" charset="0"/>
-              </a:rPr>
-              <a:t>&gt;(</a:t>
-            </a:r>
-            <a:r>
-              <a:rPr kumimoji="0" lang="de-DE" altLang="de-DE" sz="1100" b="0" i="0" u="none" strike="noStrike" cap="none" normalizeH="0" baseline="0" dirty="0" smtClean="0">
-                <a:ln>
-                  <a:noFill/>
-                </a:ln>
-                <a:solidFill>
-                  <a:srgbClr val="A31515"/>
-                </a:solidFill>
-                <a:effectLst/>
-                <a:latin typeface="Consolas" panose="020B0609020204030204" pitchFamily="49" charset="0"/>
-                <a:cs typeface="Consolas" panose="020B0609020204030204" pitchFamily="49" charset="0"/>
-              </a:rPr>
-              <a:t>"</a:t>
-            </a:r>
-            <a:r>
-              <a:rPr kumimoji="0" lang="de-DE" altLang="de-DE" sz="1100" b="0" i="0" u="none" strike="noStrike" cap="none" normalizeH="0" baseline="0" dirty="0" err="1" smtClean="0">
-                <a:ln>
-                  <a:noFill/>
-                </a:ln>
-                <a:solidFill>
-                  <a:srgbClr val="A31515"/>
-                </a:solidFill>
-                <a:effectLst/>
-                <a:latin typeface="Consolas" panose="020B0609020204030204" pitchFamily="49" charset="0"/>
-                <a:cs typeface="Consolas" panose="020B0609020204030204" pitchFamily="49" charset="0"/>
-              </a:rPr>
-              <a:t>PopulationSize</a:t>
-            </a:r>
-            <a:r>
-              <a:rPr kumimoji="0" lang="de-DE" altLang="de-DE" sz="1100" b="0" i="0" u="none" strike="noStrike" cap="none" normalizeH="0" baseline="0" dirty="0" smtClean="0">
-                <a:ln>
-                  <a:noFill/>
-                </a:ln>
-                <a:solidFill>
-                  <a:srgbClr val="A31515"/>
-                </a:solidFill>
-                <a:effectLst/>
-                <a:latin typeface="Consolas" panose="020B0609020204030204" pitchFamily="49" charset="0"/>
-                <a:cs typeface="Consolas" panose="020B0609020204030204" pitchFamily="49" charset="0"/>
-              </a:rPr>
-              <a:t>"</a:t>
-            </a:r>
-            <a:r>
-              <a:rPr kumimoji="0" lang="de-DE" altLang="de-DE" sz="1100" b="0" i="0" u="none" strike="noStrike" cap="none" normalizeH="0" baseline="0" dirty="0" smtClean="0">
-                <a:ln>
-                  <a:noFill/>
-                </a:ln>
-                <a:solidFill>
-                  <a:srgbClr val="000000"/>
-                </a:solidFill>
-                <a:effectLst/>
-                <a:latin typeface="Consolas" panose="020B0609020204030204" pitchFamily="49" charset="0"/>
-                <a:cs typeface="Consolas" panose="020B0609020204030204" pitchFamily="49" charset="0"/>
-              </a:rPr>
-              <a:t>, </a:t>
-            </a:r>
-          </a:p>
-          <a:p>
-            <a:pPr marL="0" marR="0" lvl="0" indent="0" algn="l" defTabSz="914400" rtl="0" eaLnBrk="0" fontAlgn="base" latinLnBrk="0" hangingPunct="0">
-              <a:lnSpc>
-                <a:spcPct val="100000"/>
-              </a:lnSpc>
-              <a:spcBef>
-                <a:spcPct val="0"/>
-              </a:spcBef>
-              <a:spcAft>
-                <a:spcPct val="0"/>
-              </a:spcAft>
-              <a:buClrTx/>
-              <a:buSzTx/>
-              <a:buFontTx/>
-              <a:buNone/>
-              <a:tabLst/>
-            </a:pPr>
-            <a:r>
-              <a:rPr kumimoji="0" lang="de-DE" altLang="de-DE" sz="1100" b="0" i="0" u="none" strike="noStrike" cap="none" normalizeH="0" baseline="0" dirty="0" smtClean="0">
-                <a:ln>
-                  <a:noFill/>
-                </a:ln>
-                <a:solidFill>
-                  <a:srgbClr val="A31515"/>
-                </a:solidFill>
-                <a:effectLst/>
-                <a:latin typeface="Consolas" panose="020B0609020204030204" pitchFamily="49" charset="0"/>
-                <a:cs typeface="Consolas" panose="020B0609020204030204" pitchFamily="49" charset="0"/>
-              </a:rPr>
-              <a:t>"The </a:t>
-            </a:r>
-            <a:r>
-              <a:rPr kumimoji="0" lang="de-DE" altLang="de-DE" sz="1100" b="0" i="0" u="none" strike="noStrike" cap="none" normalizeH="0" baseline="0" dirty="0" err="1" smtClean="0">
-                <a:ln>
-                  <a:noFill/>
-                </a:ln>
-                <a:solidFill>
-                  <a:srgbClr val="A31515"/>
-                </a:solidFill>
-                <a:effectLst/>
-                <a:latin typeface="Consolas" panose="020B0609020204030204" pitchFamily="49" charset="0"/>
-                <a:cs typeface="Consolas" panose="020B0609020204030204" pitchFamily="49" charset="0"/>
-              </a:rPr>
-              <a:t>size</a:t>
-            </a:r>
-            <a:r>
-              <a:rPr kumimoji="0" lang="de-DE" altLang="de-DE" sz="1100" b="0" i="0" u="none" strike="noStrike" cap="none" normalizeH="0" baseline="0" dirty="0" smtClean="0">
-                <a:ln>
-                  <a:noFill/>
-                </a:ln>
-                <a:solidFill>
-                  <a:srgbClr val="A31515"/>
-                </a:solidFill>
-                <a:effectLst/>
-                <a:latin typeface="Consolas" panose="020B0609020204030204" pitchFamily="49" charset="0"/>
-                <a:cs typeface="Consolas" panose="020B0609020204030204" pitchFamily="49" charset="0"/>
-              </a:rPr>
-              <a:t> </a:t>
-            </a:r>
-            <a:r>
-              <a:rPr kumimoji="0" lang="de-DE" altLang="de-DE" sz="1100" b="0" i="0" u="none" strike="noStrike" cap="none" normalizeH="0" baseline="0" dirty="0" err="1" smtClean="0">
-                <a:ln>
-                  <a:noFill/>
-                </a:ln>
-                <a:solidFill>
-                  <a:srgbClr val="A31515"/>
-                </a:solidFill>
-                <a:effectLst/>
-                <a:latin typeface="Consolas" panose="020B0609020204030204" pitchFamily="49" charset="0"/>
-                <a:cs typeface="Consolas" panose="020B0609020204030204" pitchFamily="49" charset="0"/>
-              </a:rPr>
-              <a:t>of</a:t>
-            </a:r>
-            <a:r>
-              <a:rPr kumimoji="0" lang="de-DE" altLang="de-DE" sz="1100" b="0" i="0" u="none" strike="noStrike" cap="none" normalizeH="0" baseline="0" dirty="0" smtClean="0">
-                <a:ln>
-                  <a:noFill/>
-                </a:ln>
-                <a:solidFill>
-                  <a:srgbClr val="A31515"/>
-                </a:solidFill>
-                <a:effectLst/>
-                <a:latin typeface="Consolas" panose="020B0609020204030204" pitchFamily="49" charset="0"/>
-                <a:cs typeface="Consolas" panose="020B0609020204030204" pitchFamily="49" charset="0"/>
-              </a:rPr>
-              <a:t> </a:t>
-            </a:r>
-            <a:r>
-              <a:rPr kumimoji="0" lang="de-DE" altLang="de-DE" sz="1100" b="0" i="0" u="none" strike="noStrike" cap="none" normalizeH="0" baseline="0" dirty="0" err="1" smtClean="0">
-                <a:ln>
-                  <a:noFill/>
-                </a:ln>
-                <a:solidFill>
-                  <a:srgbClr val="A31515"/>
-                </a:solidFill>
-                <a:effectLst/>
-                <a:latin typeface="Consolas" panose="020B0609020204030204" pitchFamily="49" charset="0"/>
-                <a:cs typeface="Consolas" panose="020B0609020204030204" pitchFamily="49" charset="0"/>
-              </a:rPr>
-              <a:t>the</a:t>
-            </a:r>
-            <a:r>
-              <a:rPr kumimoji="0" lang="de-DE" altLang="de-DE" sz="1100" b="0" i="0" u="none" strike="noStrike" cap="none" normalizeH="0" baseline="0" dirty="0" smtClean="0">
-                <a:ln>
-                  <a:noFill/>
-                </a:ln>
-                <a:solidFill>
-                  <a:srgbClr val="A31515"/>
-                </a:solidFill>
-                <a:effectLst/>
-                <a:latin typeface="Consolas" panose="020B0609020204030204" pitchFamily="49" charset="0"/>
-                <a:cs typeface="Consolas" panose="020B0609020204030204" pitchFamily="49" charset="0"/>
-              </a:rPr>
-              <a:t> </a:t>
-            </a:r>
-            <a:r>
-              <a:rPr kumimoji="0" lang="de-DE" altLang="de-DE" sz="1200" b="0" i="0" u="none" strike="noStrike" cap="none" normalizeH="0" baseline="0" dirty="0" err="1" smtClean="0">
-                <a:ln>
-                  <a:noFill/>
-                </a:ln>
-                <a:solidFill>
-                  <a:srgbClr val="A31515"/>
-                </a:solidFill>
-                <a:effectLst/>
-                <a:latin typeface="Consolas" panose="020B0609020204030204" pitchFamily="49" charset="0"/>
-                <a:cs typeface="Consolas" panose="020B0609020204030204" pitchFamily="49" charset="0"/>
-              </a:rPr>
-              <a:t>population</a:t>
-            </a:r>
-            <a:r>
-              <a:rPr kumimoji="0" lang="de-DE" altLang="de-DE" sz="1100" b="0" i="0" u="none" strike="noStrike" cap="none" normalizeH="0" baseline="0" dirty="0" smtClean="0">
-                <a:ln>
-                  <a:noFill/>
-                </a:ln>
-                <a:solidFill>
-                  <a:srgbClr val="A31515"/>
-                </a:solidFill>
-                <a:effectLst/>
-                <a:latin typeface="Consolas" panose="020B0609020204030204" pitchFamily="49" charset="0"/>
-                <a:cs typeface="Consolas" panose="020B0609020204030204" pitchFamily="49" charset="0"/>
-              </a:rPr>
-              <a:t> </a:t>
-            </a:r>
-            <a:r>
-              <a:rPr kumimoji="0" lang="de-DE" altLang="de-DE" sz="1100" b="0" i="0" u="none" strike="noStrike" cap="none" normalizeH="0" baseline="0" dirty="0" err="1" smtClean="0">
-                <a:ln>
-                  <a:noFill/>
-                </a:ln>
-                <a:solidFill>
-                  <a:srgbClr val="A31515"/>
-                </a:solidFill>
-                <a:effectLst/>
-                <a:latin typeface="Consolas" panose="020B0609020204030204" pitchFamily="49" charset="0"/>
-                <a:cs typeface="Consolas" panose="020B0609020204030204" pitchFamily="49" charset="0"/>
-              </a:rPr>
-              <a:t>of</a:t>
-            </a:r>
-            <a:r>
-              <a:rPr kumimoji="0" lang="de-DE" altLang="de-DE" sz="1100" b="0" i="0" u="none" strike="noStrike" cap="none" normalizeH="0" baseline="0" dirty="0" smtClean="0">
-                <a:ln>
-                  <a:noFill/>
-                </a:ln>
-                <a:solidFill>
-                  <a:srgbClr val="A31515"/>
-                </a:solidFill>
-                <a:effectLst/>
-                <a:latin typeface="Consolas" panose="020B0609020204030204" pitchFamily="49" charset="0"/>
-                <a:cs typeface="Consolas" panose="020B0609020204030204" pitchFamily="49" charset="0"/>
-              </a:rPr>
-              <a:t> </a:t>
-            </a:r>
-            <a:r>
-              <a:rPr kumimoji="0" lang="de-DE" altLang="de-DE" sz="1100" b="0" i="0" u="none" strike="noStrike" cap="none" normalizeH="0" baseline="0" dirty="0" err="1" smtClean="0">
-                <a:ln>
-                  <a:noFill/>
-                </a:ln>
-                <a:solidFill>
-                  <a:srgbClr val="A31515"/>
-                </a:solidFill>
-                <a:effectLst/>
-                <a:latin typeface="Consolas" panose="020B0609020204030204" pitchFamily="49" charset="0"/>
-                <a:cs typeface="Consolas" panose="020B0609020204030204" pitchFamily="49" charset="0"/>
-              </a:rPr>
-              <a:t>solutions</a:t>
-            </a:r>
-            <a:r>
-              <a:rPr kumimoji="0" lang="de-DE" altLang="de-DE" sz="1100" b="0" i="0" u="none" strike="noStrike" cap="none" normalizeH="0" baseline="0" dirty="0" smtClean="0">
-                <a:ln>
-                  <a:noFill/>
-                </a:ln>
-                <a:solidFill>
-                  <a:srgbClr val="A31515"/>
-                </a:solidFill>
-                <a:effectLst/>
-                <a:latin typeface="Consolas" panose="020B0609020204030204" pitchFamily="49" charset="0"/>
-                <a:cs typeface="Consolas" panose="020B0609020204030204" pitchFamily="49" charset="0"/>
-              </a:rPr>
-              <a:t>."</a:t>
-            </a:r>
-            <a:r>
-              <a:rPr kumimoji="0" lang="de-DE" altLang="de-DE" sz="1100" b="0" i="0" u="none" strike="noStrike" cap="none" normalizeH="0" baseline="0" dirty="0" smtClean="0">
-                <a:ln>
-                  <a:noFill/>
-                </a:ln>
-                <a:solidFill>
-                  <a:srgbClr val="000000"/>
-                </a:solidFill>
-                <a:effectLst/>
-                <a:latin typeface="Consolas" panose="020B0609020204030204" pitchFamily="49" charset="0"/>
-                <a:cs typeface="Consolas" panose="020B0609020204030204" pitchFamily="49" charset="0"/>
-              </a:rPr>
-              <a:t>, </a:t>
-            </a:r>
-            <a:r>
-              <a:rPr kumimoji="0" lang="de-DE" altLang="de-DE" sz="1100" b="0" i="0" u="none" strike="noStrike" cap="none" normalizeH="0" baseline="0" dirty="0" err="1" smtClean="0">
-                <a:ln>
-                  <a:noFill/>
-                </a:ln>
-                <a:solidFill>
-                  <a:srgbClr val="0000FF"/>
-                </a:solidFill>
-                <a:effectLst/>
-                <a:latin typeface="Consolas" panose="020B0609020204030204" pitchFamily="49" charset="0"/>
-                <a:cs typeface="Consolas" panose="020B0609020204030204" pitchFamily="49" charset="0"/>
-              </a:rPr>
-              <a:t>new</a:t>
-            </a:r>
-            <a:r>
-              <a:rPr kumimoji="0" lang="de-DE" altLang="de-DE" sz="1100" b="0" i="0" u="none" strike="noStrike" cap="none" normalizeH="0" baseline="0" dirty="0" smtClean="0">
-                <a:ln>
-                  <a:noFill/>
-                </a:ln>
-                <a:solidFill>
-                  <a:srgbClr val="000000"/>
-                </a:solidFill>
-                <a:effectLst/>
-                <a:latin typeface="Consolas" panose="020B0609020204030204" pitchFamily="49" charset="0"/>
-                <a:cs typeface="Consolas" panose="020B0609020204030204" pitchFamily="49" charset="0"/>
-              </a:rPr>
-              <a:t> </a:t>
-            </a:r>
-            <a:r>
-              <a:rPr kumimoji="0" lang="de-DE" altLang="de-DE" sz="1100" b="0" i="0" u="none" strike="noStrike" cap="none" normalizeH="0" baseline="0" dirty="0" err="1" smtClean="0">
-                <a:ln>
-                  <a:noFill/>
-                </a:ln>
-                <a:solidFill>
-                  <a:srgbClr val="2B91AF"/>
-                </a:solidFill>
-                <a:effectLst/>
-                <a:latin typeface="Consolas" panose="020B0609020204030204" pitchFamily="49" charset="0"/>
-                <a:cs typeface="Consolas" panose="020B0609020204030204" pitchFamily="49" charset="0"/>
-              </a:rPr>
-              <a:t>IntValue</a:t>
-            </a:r>
-            <a:r>
-              <a:rPr kumimoji="0" lang="de-DE" altLang="de-DE" sz="1100" b="0" i="0" u="none" strike="noStrike" cap="none" normalizeH="0" baseline="0" dirty="0" smtClean="0">
-                <a:ln>
-                  <a:noFill/>
-                </a:ln>
-                <a:solidFill>
-                  <a:srgbClr val="000000"/>
-                </a:solidFill>
-                <a:effectLst/>
-                <a:latin typeface="Consolas" panose="020B0609020204030204" pitchFamily="49" charset="0"/>
-                <a:cs typeface="Consolas" panose="020B0609020204030204" pitchFamily="49" charset="0"/>
-              </a:rPr>
-              <a:t>(100))); </a:t>
-            </a:r>
-            <a:endParaRPr kumimoji="0" lang="de-DE" altLang="de-DE" sz="2800" b="0" i="0" u="none" strike="noStrike" cap="none" normalizeH="0" baseline="0" dirty="0" smtClean="0">
-              <a:ln>
-                <a:noFill/>
-              </a:ln>
-              <a:solidFill>
-                <a:schemeClr val="tx1"/>
-              </a:solidFill>
-              <a:effectLst/>
-              <a:latin typeface="Arial" panose="020B0604020202020204" pitchFamily="34" charset="0"/>
-            </a:endParaRPr>
-          </a:p>
-        </p:txBody>
-      </p:sp>
     </p:spTree>
     <p:extLst>
       <p:ext uri="{BB962C8B-B14F-4D97-AF65-F5344CB8AC3E}">

</xml_diff>